<commit_message>
add tipss loop invariant
</commit_message>
<xml_diff>
--- a/material/w03/w03.pptx
+++ b/material/w03/w03.pptx
@@ -7,10 +7,10 @@
     <p:sldMasterId id="2147483674" r:id="rId3"/>
   </p:sldMasterIdLst>
   <p:notesMasterIdLst>
-    <p:notesMasterId r:id="rId17"/>
+    <p:notesMasterId r:id="rId18"/>
   </p:notesMasterIdLst>
   <p:handoutMasterIdLst>
-    <p:handoutMasterId r:id="rId18"/>
+    <p:handoutMasterId r:id="rId19"/>
   </p:handoutMasterIdLst>
   <p:sldIdLst>
     <p:sldId id="256" r:id="rId4"/>
@@ -26,6 +26,7 @@
     <p:sldId id="277" r:id="rId14"/>
     <p:sldId id="269" r:id="rId15"/>
     <p:sldId id="278" r:id="rId16"/>
+    <p:sldId id="279" r:id="rId17"/>
   </p:sldIdLst>
   <p:sldSz cx="9144000" cy="5143500" type="screen16x9"/>
   <p:notesSz cx="7559675" cy="10691813"/>
@@ -12524,8 +12525,8 @@
           </a:prstGeom>
         </p:spPr>
       </p:pic>
-      <mc:AlternateContent xmlns:mc="http://schemas.openxmlformats.org/markup-compatibility/2006">
-        <mc:Choice xmlns:p14="http://schemas.microsoft.com/office/powerpoint/2010/main" Requires="p14">
+      <mc:AlternateContent xmlns:mc="http://schemas.openxmlformats.org/markup-compatibility/2006" xmlns:p14="http://schemas.microsoft.com/office/powerpoint/2010/main">
+        <mc:Choice Requires="p14">
           <p:contentPart p14:bwMode="auto" r:id="rId3">
             <p14:nvContentPartPr>
               <p14:cNvPr id="4" name="Freihand 3">
@@ -12544,7 +12545,7 @@
             </p14:xfrm>
           </p:contentPart>
         </mc:Choice>
-        <mc:Fallback>
+        <mc:Fallback xmlns="">
           <p:pic>
             <p:nvPicPr>
               <p:cNvPr id="4" name="Freihand 3">
@@ -12624,8 +12625,8 @@
             <a:chExt cx="54720" cy="96840"/>
           </a:xfrm>
         </p:grpSpPr>
-        <mc:AlternateContent xmlns:mc="http://schemas.openxmlformats.org/markup-compatibility/2006">
-          <mc:Choice xmlns:p14="http://schemas.microsoft.com/office/powerpoint/2010/main" Requires="p14">
+        <mc:AlternateContent xmlns:mc="http://schemas.openxmlformats.org/markup-compatibility/2006" xmlns:p14="http://schemas.microsoft.com/office/powerpoint/2010/main">
+          <mc:Choice Requires="p14">
             <p:contentPart p14:bwMode="auto" r:id="rId6">
               <p14:nvContentPartPr>
                 <p14:cNvPr id="8" name="Freihand 7">
@@ -12644,7 +12645,7 @@
               </p14:xfrm>
             </p:contentPart>
           </mc:Choice>
-          <mc:Fallback>
+          <mc:Fallback xmlns="">
             <p:pic>
               <p:nvPicPr>
                 <p:cNvPr id="8" name="Freihand 7">
@@ -12675,8 +12676,8 @@
             </p:pic>
           </mc:Fallback>
         </mc:AlternateContent>
-        <mc:AlternateContent xmlns:mc="http://schemas.openxmlformats.org/markup-compatibility/2006">
-          <mc:Choice xmlns:p14="http://schemas.microsoft.com/office/powerpoint/2010/main" Requires="p14">
+        <mc:AlternateContent xmlns:mc="http://schemas.openxmlformats.org/markup-compatibility/2006" xmlns:p14="http://schemas.microsoft.com/office/powerpoint/2010/main">
+          <mc:Choice Requires="p14">
             <p:contentPart p14:bwMode="auto" r:id="rId8">
               <p14:nvContentPartPr>
                 <p14:cNvPr id="9" name="Freihand 8">
@@ -12695,7 +12696,7 @@
               </p14:xfrm>
             </p:contentPart>
           </mc:Choice>
-          <mc:Fallback>
+          <mc:Fallback xmlns="">
             <p:pic>
               <p:nvPicPr>
                 <p:cNvPr id="9" name="Freihand 8">
@@ -12747,8 +12748,8 @@
             <a:chExt cx="77760" cy="106560"/>
           </a:xfrm>
         </p:grpSpPr>
-        <mc:AlternateContent xmlns:mc="http://schemas.openxmlformats.org/markup-compatibility/2006">
-          <mc:Choice xmlns:p14="http://schemas.microsoft.com/office/powerpoint/2010/main" Requires="p14">
+        <mc:AlternateContent xmlns:mc="http://schemas.openxmlformats.org/markup-compatibility/2006" xmlns:p14="http://schemas.microsoft.com/office/powerpoint/2010/main">
+          <mc:Choice Requires="p14">
             <p:contentPart p14:bwMode="auto" r:id="rId10">
               <p14:nvContentPartPr>
                 <p14:cNvPr id="12" name="Freihand 11">
@@ -12767,7 +12768,7 @@
               </p14:xfrm>
             </p:contentPart>
           </mc:Choice>
-          <mc:Fallback>
+          <mc:Fallback xmlns="">
             <p:pic>
               <p:nvPicPr>
                 <p:cNvPr id="12" name="Freihand 11">
@@ -12798,8 +12799,8 @@
             </p:pic>
           </mc:Fallback>
         </mc:AlternateContent>
-        <mc:AlternateContent xmlns:mc="http://schemas.openxmlformats.org/markup-compatibility/2006">
-          <mc:Choice xmlns:p14="http://schemas.microsoft.com/office/powerpoint/2010/main" Requires="p14">
+        <mc:AlternateContent xmlns:mc="http://schemas.openxmlformats.org/markup-compatibility/2006" xmlns:p14="http://schemas.microsoft.com/office/powerpoint/2010/main">
+          <mc:Choice Requires="p14">
             <p:contentPart p14:bwMode="auto" r:id="rId12">
               <p14:nvContentPartPr>
                 <p14:cNvPr id="13" name="Freihand 12">
@@ -12818,7 +12819,7 @@
               </p14:xfrm>
             </p:contentPart>
           </mc:Choice>
-          <mc:Fallback>
+          <mc:Fallback xmlns="">
             <p:pic>
               <p:nvPicPr>
                 <p:cNvPr id="13" name="Freihand 12">
@@ -12870,8 +12871,8 @@
             <a:chExt cx="97200" cy="122040"/>
           </a:xfrm>
         </p:grpSpPr>
-        <mc:AlternateContent xmlns:mc="http://schemas.openxmlformats.org/markup-compatibility/2006">
-          <mc:Choice xmlns:p14="http://schemas.microsoft.com/office/powerpoint/2010/main" Requires="p14">
+        <mc:AlternateContent xmlns:mc="http://schemas.openxmlformats.org/markup-compatibility/2006" xmlns:p14="http://schemas.microsoft.com/office/powerpoint/2010/main">
+          <mc:Choice Requires="p14">
             <p:contentPart p14:bwMode="auto" r:id="rId14">
               <p14:nvContentPartPr>
                 <p14:cNvPr id="15" name="Freihand 14">
@@ -12890,7 +12891,7 @@
               </p14:xfrm>
             </p:contentPart>
           </mc:Choice>
-          <mc:Fallback>
+          <mc:Fallback xmlns="">
             <p:pic>
               <p:nvPicPr>
                 <p:cNvPr id="15" name="Freihand 14">
@@ -12921,8 +12922,8 @@
             </p:pic>
           </mc:Fallback>
         </mc:AlternateContent>
-        <mc:AlternateContent xmlns:mc="http://schemas.openxmlformats.org/markup-compatibility/2006">
-          <mc:Choice xmlns:p14="http://schemas.microsoft.com/office/powerpoint/2010/main" Requires="p14">
+        <mc:AlternateContent xmlns:mc="http://schemas.openxmlformats.org/markup-compatibility/2006" xmlns:p14="http://schemas.microsoft.com/office/powerpoint/2010/main">
+          <mc:Choice Requires="p14">
             <p:contentPart p14:bwMode="auto" r:id="rId16">
               <p14:nvContentPartPr>
                 <p14:cNvPr id="16" name="Freihand 15">
@@ -12941,7 +12942,7 @@
               </p14:xfrm>
             </p:contentPart>
           </mc:Choice>
-          <mc:Fallback>
+          <mc:Fallback xmlns="">
             <p:pic>
               <p:nvPicPr>
                 <p:cNvPr id="16" name="Freihand 15">
@@ -12973,8 +12974,8 @@
           </mc:Fallback>
         </mc:AlternateContent>
       </p:grpSp>
-      <mc:AlternateContent xmlns:mc="http://schemas.openxmlformats.org/markup-compatibility/2006">
-        <mc:Choice xmlns:p14="http://schemas.microsoft.com/office/powerpoint/2010/main" Requires="p14">
+      <mc:AlternateContent xmlns:mc="http://schemas.openxmlformats.org/markup-compatibility/2006" xmlns:p14="http://schemas.microsoft.com/office/powerpoint/2010/main">
+        <mc:Choice Requires="p14">
           <p:contentPart p14:bwMode="auto" r:id="rId18">
             <p14:nvContentPartPr>
               <p14:cNvPr id="17" name="Freihand 16">
@@ -12993,7 +12994,7 @@
             </p14:xfrm>
           </p:contentPart>
         </mc:Choice>
-        <mc:Fallback>
+        <mc:Fallback xmlns="">
           <p:pic>
             <p:nvPicPr>
               <p:cNvPr id="17" name="Freihand 16">
@@ -13044,8 +13045,8 @@
             <a:chExt cx="74880" cy="72000"/>
           </a:xfrm>
         </p:grpSpPr>
-        <mc:AlternateContent xmlns:mc="http://schemas.openxmlformats.org/markup-compatibility/2006">
-          <mc:Choice xmlns:p14="http://schemas.microsoft.com/office/powerpoint/2010/main" Requires="p14">
+        <mc:AlternateContent xmlns:mc="http://schemas.openxmlformats.org/markup-compatibility/2006" xmlns:p14="http://schemas.microsoft.com/office/powerpoint/2010/main">
+          <mc:Choice Requires="p14">
             <p:contentPart p14:bwMode="auto" r:id="rId20">
               <p14:nvContentPartPr>
                 <p14:cNvPr id="19" name="Freihand 18">
@@ -13064,7 +13065,7 @@
               </p14:xfrm>
             </p:contentPart>
           </mc:Choice>
-          <mc:Fallback>
+          <mc:Fallback xmlns="">
             <p:pic>
               <p:nvPicPr>
                 <p:cNvPr id="19" name="Freihand 18">
@@ -13095,8 +13096,8 @@
             </p:pic>
           </mc:Fallback>
         </mc:AlternateContent>
-        <mc:AlternateContent xmlns:mc="http://schemas.openxmlformats.org/markup-compatibility/2006">
-          <mc:Choice xmlns:p14="http://schemas.microsoft.com/office/powerpoint/2010/main" Requires="p14">
+        <mc:AlternateContent xmlns:mc="http://schemas.openxmlformats.org/markup-compatibility/2006" xmlns:p14="http://schemas.microsoft.com/office/powerpoint/2010/main">
+          <mc:Choice Requires="p14">
             <p:contentPart p14:bwMode="auto" r:id="rId22">
               <p14:nvContentPartPr>
                 <p14:cNvPr id="20" name="Freihand 19">
@@ -13115,7 +13116,7 @@
               </p14:xfrm>
             </p:contentPart>
           </mc:Choice>
-          <mc:Fallback>
+          <mc:Fallback xmlns="">
             <p:pic>
               <p:nvPicPr>
                 <p:cNvPr id="20" name="Freihand 19">
@@ -13147,8 +13148,8 @@
           </mc:Fallback>
         </mc:AlternateContent>
       </p:grpSp>
-      <mc:AlternateContent xmlns:mc="http://schemas.openxmlformats.org/markup-compatibility/2006">
-        <mc:Choice xmlns:p14="http://schemas.microsoft.com/office/powerpoint/2010/main" Requires="p14">
+      <mc:AlternateContent xmlns:mc="http://schemas.openxmlformats.org/markup-compatibility/2006" xmlns:p14="http://schemas.microsoft.com/office/powerpoint/2010/main">
+        <mc:Choice Requires="p14">
           <p:contentPart p14:bwMode="auto" r:id="rId24">
             <p14:nvContentPartPr>
               <p14:cNvPr id="21" name="Freihand 20">
@@ -13167,7 +13168,7 @@
             </p14:xfrm>
           </p:contentPart>
         </mc:Choice>
-        <mc:Fallback>
+        <mc:Fallback xmlns="">
           <p:pic>
             <p:nvPicPr>
               <p:cNvPr id="21" name="Freihand 20">
@@ -13198,8 +13199,8 @@
           </p:pic>
         </mc:Fallback>
       </mc:AlternateContent>
-      <mc:AlternateContent xmlns:mc="http://schemas.openxmlformats.org/markup-compatibility/2006">
-        <mc:Choice xmlns:p14="http://schemas.microsoft.com/office/powerpoint/2010/main" Requires="p14">
+      <mc:AlternateContent xmlns:mc="http://schemas.openxmlformats.org/markup-compatibility/2006" xmlns:p14="http://schemas.microsoft.com/office/powerpoint/2010/main">
+        <mc:Choice Requires="p14">
           <p:contentPart p14:bwMode="auto" r:id="rId26">
             <p14:nvContentPartPr>
               <p14:cNvPr id="22" name="Freihand 21">
@@ -13218,7 +13219,7 @@
             </p14:xfrm>
           </p:contentPart>
         </mc:Choice>
-        <mc:Fallback>
+        <mc:Fallback xmlns="">
           <p:pic>
             <p:nvPicPr>
               <p:cNvPr id="22" name="Freihand 21">
@@ -13269,8 +13270,8 @@
             <a:chExt cx="100080" cy="113040"/>
           </a:xfrm>
         </p:grpSpPr>
-        <mc:AlternateContent xmlns:mc="http://schemas.openxmlformats.org/markup-compatibility/2006">
-          <mc:Choice xmlns:p14="http://schemas.microsoft.com/office/powerpoint/2010/main" Requires="p14">
+        <mc:AlternateContent xmlns:mc="http://schemas.openxmlformats.org/markup-compatibility/2006" xmlns:p14="http://schemas.microsoft.com/office/powerpoint/2010/main">
+          <mc:Choice Requires="p14">
             <p:contentPart p14:bwMode="auto" r:id="rId28">
               <p14:nvContentPartPr>
                 <p14:cNvPr id="24" name="Freihand 23">
@@ -13289,7 +13290,7 @@
               </p14:xfrm>
             </p:contentPart>
           </mc:Choice>
-          <mc:Fallback>
+          <mc:Fallback xmlns="">
             <p:pic>
               <p:nvPicPr>
                 <p:cNvPr id="24" name="Freihand 23">
@@ -13320,8 +13321,8 @@
             </p:pic>
           </mc:Fallback>
         </mc:AlternateContent>
-        <mc:AlternateContent xmlns:mc="http://schemas.openxmlformats.org/markup-compatibility/2006">
-          <mc:Choice xmlns:p14="http://schemas.microsoft.com/office/powerpoint/2010/main" Requires="p14">
+        <mc:AlternateContent xmlns:mc="http://schemas.openxmlformats.org/markup-compatibility/2006" xmlns:p14="http://schemas.microsoft.com/office/powerpoint/2010/main">
+          <mc:Choice Requires="p14">
             <p:contentPart p14:bwMode="auto" r:id="rId30">
               <p14:nvContentPartPr>
                 <p14:cNvPr id="25" name="Freihand 24">
@@ -13340,7 +13341,7 @@
               </p14:xfrm>
             </p:contentPart>
           </mc:Choice>
-          <mc:Fallback>
+          <mc:Fallback xmlns="">
             <p:pic>
               <p:nvPicPr>
                 <p:cNvPr id="25" name="Freihand 24">
@@ -13371,8 +13372,8 @@
             </p:pic>
           </mc:Fallback>
         </mc:AlternateContent>
-        <mc:AlternateContent xmlns:mc="http://schemas.openxmlformats.org/markup-compatibility/2006">
-          <mc:Choice xmlns:p14="http://schemas.microsoft.com/office/powerpoint/2010/main" Requires="p14">
+        <mc:AlternateContent xmlns:mc="http://schemas.openxmlformats.org/markup-compatibility/2006" xmlns:p14="http://schemas.microsoft.com/office/powerpoint/2010/main">
+          <mc:Choice Requires="p14">
             <p:contentPart p14:bwMode="auto" r:id="rId32">
               <p14:nvContentPartPr>
                 <p14:cNvPr id="26" name="Freihand 25">
@@ -13391,7 +13392,7 @@
               </p14:xfrm>
             </p:contentPart>
           </mc:Choice>
-          <mc:Fallback>
+          <mc:Fallback xmlns="">
             <p:pic>
               <p:nvPicPr>
                 <p:cNvPr id="26" name="Freihand 25">
@@ -13423,8 +13424,8 @@
           </mc:Fallback>
         </mc:AlternateContent>
       </p:grpSp>
-      <mc:AlternateContent xmlns:mc="http://schemas.openxmlformats.org/markup-compatibility/2006">
-        <mc:Choice xmlns:p14="http://schemas.microsoft.com/office/powerpoint/2010/main" Requires="p14">
+      <mc:AlternateContent xmlns:mc="http://schemas.openxmlformats.org/markup-compatibility/2006" xmlns:p14="http://schemas.microsoft.com/office/powerpoint/2010/main">
+        <mc:Choice Requires="p14">
           <p:contentPart p14:bwMode="auto" r:id="rId34">
             <p14:nvContentPartPr>
               <p14:cNvPr id="27" name="Freihand 26">
@@ -13443,7 +13444,7 @@
             </p14:xfrm>
           </p:contentPart>
         </mc:Choice>
-        <mc:Fallback>
+        <mc:Fallback xmlns="">
           <p:pic>
             <p:nvPicPr>
               <p:cNvPr id="27" name="Freihand 26">
@@ -13494,8 +13495,8 @@
             <a:chExt cx="50040" cy="93960"/>
           </a:xfrm>
         </p:grpSpPr>
-        <mc:AlternateContent xmlns:mc="http://schemas.openxmlformats.org/markup-compatibility/2006">
-          <mc:Choice xmlns:p14="http://schemas.microsoft.com/office/powerpoint/2010/main" Requires="p14">
+        <mc:AlternateContent xmlns:mc="http://schemas.openxmlformats.org/markup-compatibility/2006" xmlns:p14="http://schemas.microsoft.com/office/powerpoint/2010/main">
+          <mc:Choice Requires="p14">
             <p:contentPart p14:bwMode="auto" r:id="rId36">
               <p14:nvContentPartPr>
                 <p14:cNvPr id="29" name="Freihand 28">
@@ -13514,7 +13515,7 @@
               </p14:xfrm>
             </p:contentPart>
           </mc:Choice>
-          <mc:Fallback>
+          <mc:Fallback xmlns="">
             <p:pic>
               <p:nvPicPr>
                 <p:cNvPr id="29" name="Freihand 28">
@@ -13545,8 +13546,8 @@
             </p:pic>
           </mc:Fallback>
         </mc:AlternateContent>
-        <mc:AlternateContent xmlns:mc="http://schemas.openxmlformats.org/markup-compatibility/2006">
-          <mc:Choice xmlns:p14="http://schemas.microsoft.com/office/powerpoint/2010/main" Requires="p14">
+        <mc:AlternateContent xmlns:mc="http://schemas.openxmlformats.org/markup-compatibility/2006" xmlns:p14="http://schemas.microsoft.com/office/powerpoint/2010/main">
+          <mc:Choice Requires="p14">
             <p:contentPart p14:bwMode="auto" r:id="rId38">
               <p14:nvContentPartPr>
                 <p14:cNvPr id="30" name="Freihand 29">
@@ -13565,7 +13566,7 @@
               </p14:xfrm>
             </p:contentPart>
           </mc:Choice>
-          <mc:Fallback>
+          <mc:Fallback xmlns="">
             <p:pic>
               <p:nvPicPr>
                 <p:cNvPr id="30" name="Freihand 29">
@@ -13596,8 +13597,8 @@
             </p:pic>
           </mc:Fallback>
         </mc:AlternateContent>
-        <mc:AlternateContent xmlns:mc="http://schemas.openxmlformats.org/markup-compatibility/2006">
-          <mc:Choice xmlns:p14="http://schemas.microsoft.com/office/powerpoint/2010/main" Requires="p14">
+        <mc:AlternateContent xmlns:mc="http://schemas.openxmlformats.org/markup-compatibility/2006" xmlns:p14="http://schemas.microsoft.com/office/powerpoint/2010/main">
+          <mc:Choice Requires="p14">
             <p:contentPart p14:bwMode="auto" r:id="rId40">
               <p14:nvContentPartPr>
                 <p14:cNvPr id="31" name="Freihand 30">
@@ -13616,7 +13617,7 @@
               </p14:xfrm>
             </p:contentPart>
           </mc:Choice>
-          <mc:Fallback>
+          <mc:Fallback xmlns="">
             <p:pic>
               <p:nvPicPr>
                 <p:cNvPr id="31" name="Freihand 30">
@@ -13785,8 +13786,8 @@
             <a:chExt cx="54720" cy="96840"/>
           </a:xfrm>
         </p:grpSpPr>
-        <mc:AlternateContent xmlns:mc="http://schemas.openxmlformats.org/markup-compatibility/2006">
-          <mc:Choice xmlns:p14="http://schemas.microsoft.com/office/powerpoint/2010/main" Requires="p14">
+        <mc:AlternateContent xmlns:mc="http://schemas.openxmlformats.org/markup-compatibility/2006" xmlns:p14="http://schemas.microsoft.com/office/powerpoint/2010/main">
+          <mc:Choice Requires="p14">
             <p:contentPart p14:bwMode="auto" r:id="rId3">
               <p14:nvContentPartPr>
                 <p14:cNvPr id="8" name="Freihand 7">
@@ -13805,7 +13806,7 @@
               </p14:xfrm>
             </p:contentPart>
           </mc:Choice>
-          <mc:Fallback>
+          <mc:Fallback xmlns="">
             <p:pic>
               <p:nvPicPr>
                 <p:cNvPr id="8" name="Freihand 7">
@@ -13836,8 +13837,8 @@
             </p:pic>
           </mc:Fallback>
         </mc:AlternateContent>
-        <mc:AlternateContent xmlns:mc="http://schemas.openxmlformats.org/markup-compatibility/2006">
-          <mc:Choice xmlns:p14="http://schemas.microsoft.com/office/powerpoint/2010/main" Requires="p14">
+        <mc:AlternateContent xmlns:mc="http://schemas.openxmlformats.org/markup-compatibility/2006" xmlns:p14="http://schemas.microsoft.com/office/powerpoint/2010/main">
+          <mc:Choice Requires="p14">
             <p:contentPart p14:bwMode="auto" r:id="rId5">
               <p14:nvContentPartPr>
                 <p14:cNvPr id="9" name="Freihand 8">
@@ -13856,7 +13857,7 @@
               </p14:xfrm>
             </p:contentPart>
           </mc:Choice>
-          <mc:Fallback>
+          <mc:Fallback xmlns="">
             <p:pic>
               <p:nvPicPr>
                 <p:cNvPr id="9" name="Freihand 8">
@@ -13908,8 +13909,8 @@
             <a:chExt cx="77760" cy="106560"/>
           </a:xfrm>
         </p:grpSpPr>
-        <mc:AlternateContent xmlns:mc="http://schemas.openxmlformats.org/markup-compatibility/2006">
-          <mc:Choice xmlns:p14="http://schemas.microsoft.com/office/powerpoint/2010/main" Requires="p14">
+        <mc:AlternateContent xmlns:mc="http://schemas.openxmlformats.org/markup-compatibility/2006" xmlns:p14="http://schemas.microsoft.com/office/powerpoint/2010/main">
+          <mc:Choice Requires="p14">
             <p:contentPart p14:bwMode="auto" r:id="rId7">
               <p14:nvContentPartPr>
                 <p14:cNvPr id="12" name="Freihand 11">
@@ -13928,7 +13929,7 @@
               </p14:xfrm>
             </p:contentPart>
           </mc:Choice>
-          <mc:Fallback>
+          <mc:Fallback xmlns="">
             <p:pic>
               <p:nvPicPr>
                 <p:cNvPr id="12" name="Freihand 11">
@@ -13959,8 +13960,8 @@
             </p:pic>
           </mc:Fallback>
         </mc:AlternateContent>
-        <mc:AlternateContent xmlns:mc="http://schemas.openxmlformats.org/markup-compatibility/2006">
-          <mc:Choice xmlns:p14="http://schemas.microsoft.com/office/powerpoint/2010/main" Requires="p14">
+        <mc:AlternateContent xmlns:mc="http://schemas.openxmlformats.org/markup-compatibility/2006" xmlns:p14="http://schemas.microsoft.com/office/powerpoint/2010/main">
+          <mc:Choice Requires="p14">
             <p:contentPart p14:bwMode="auto" r:id="rId9">
               <p14:nvContentPartPr>
                 <p14:cNvPr id="13" name="Freihand 12">
@@ -13979,7 +13980,7 @@
               </p14:xfrm>
             </p:contentPart>
           </mc:Choice>
-          <mc:Fallback>
+          <mc:Fallback xmlns="">
             <p:pic>
               <p:nvPicPr>
                 <p:cNvPr id="13" name="Freihand 12">
@@ -14031,8 +14032,8 @@
             <a:chExt cx="97200" cy="122040"/>
           </a:xfrm>
         </p:grpSpPr>
-        <mc:AlternateContent xmlns:mc="http://schemas.openxmlformats.org/markup-compatibility/2006">
-          <mc:Choice xmlns:p14="http://schemas.microsoft.com/office/powerpoint/2010/main" Requires="p14">
+        <mc:AlternateContent xmlns:mc="http://schemas.openxmlformats.org/markup-compatibility/2006" xmlns:p14="http://schemas.microsoft.com/office/powerpoint/2010/main">
+          <mc:Choice Requires="p14">
             <p:contentPart p14:bwMode="auto" r:id="rId11">
               <p14:nvContentPartPr>
                 <p14:cNvPr id="15" name="Freihand 14">
@@ -14051,7 +14052,7 @@
               </p14:xfrm>
             </p:contentPart>
           </mc:Choice>
-          <mc:Fallback>
+          <mc:Fallback xmlns="">
             <p:pic>
               <p:nvPicPr>
                 <p:cNvPr id="15" name="Freihand 14">
@@ -14082,8 +14083,8 @@
             </p:pic>
           </mc:Fallback>
         </mc:AlternateContent>
-        <mc:AlternateContent xmlns:mc="http://schemas.openxmlformats.org/markup-compatibility/2006">
-          <mc:Choice xmlns:p14="http://schemas.microsoft.com/office/powerpoint/2010/main" Requires="p14">
+        <mc:AlternateContent xmlns:mc="http://schemas.openxmlformats.org/markup-compatibility/2006" xmlns:p14="http://schemas.microsoft.com/office/powerpoint/2010/main">
+          <mc:Choice Requires="p14">
             <p:contentPart p14:bwMode="auto" r:id="rId13">
               <p14:nvContentPartPr>
                 <p14:cNvPr id="16" name="Freihand 15">
@@ -14102,7 +14103,7 @@
               </p14:xfrm>
             </p:contentPart>
           </mc:Choice>
-          <mc:Fallback>
+          <mc:Fallback xmlns="">
             <p:pic>
               <p:nvPicPr>
                 <p:cNvPr id="16" name="Freihand 15">
@@ -14134,8 +14135,8 @@
           </mc:Fallback>
         </mc:AlternateContent>
       </p:grpSp>
-      <mc:AlternateContent xmlns:mc="http://schemas.openxmlformats.org/markup-compatibility/2006">
-        <mc:Choice xmlns:p14="http://schemas.microsoft.com/office/powerpoint/2010/main" Requires="p14">
+      <mc:AlternateContent xmlns:mc="http://schemas.openxmlformats.org/markup-compatibility/2006" xmlns:p14="http://schemas.microsoft.com/office/powerpoint/2010/main">
+        <mc:Choice Requires="p14">
           <p:contentPart p14:bwMode="auto" r:id="rId15">
             <p14:nvContentPartPr>
               <p14:cNvPr id="17" name="Freihand 16">
@@ -14154,7 +14155,7 @@
             </p14:xfrm>
           </p:contentPart>
         </mc:Choice>
-        <mc:Fallback>
+        <mc:Fallback xmlns="">
           <p:pic>
             <p:nvPicPr>
               <p:cNvPr id="17" name="Freihand 16">
@@ -14205,8 +14206,8 @@
             <a:chExt cx="74880" cy="72000"/>
           </a:xfrm>
         </p:grpSpPr>
-        <mc:AlternateContent xmlns:mc="http://schemas.openxmlformats.org/markup-compatibility/2006">
-          <mc:Choice xmlns:p14="http://schemas.microsoft.com/office/powerpoint/2010/main" Requires="p14">
+        <mc:AlternateContent xmlns:mc="http://schemas.openxmlformats.org/markup-compatibility/2006" xmlns:p14="http://schemas.microsoft.com/office/powerpoint/2010/main">
+          <mc:Choice Requires="p14">
             <p:contentPart p14:bwMode="auto" r:id="rId17">
               <p14:nvContentPartPr>
                 <p14:cNvPr id="19" name="Freihand 18">
@@ -14225,7 +14226,7 @@
               </p14:xfrm>
             </p:contentPart>
           </mc:Choice>
-          <mc:Fallback>
+          <mc:Fallback xmlns="">
             <p:pic>
               <p:nvPicPr>
                 <p:cNvPr id="19" name="Freihand 18">
@@ -14256,8 +14257,8 @@
             </p:pic>
           </mc:Fallback>
         </mc:AlternateContent>
-        <mc:AlternateContent xmlns:mc="http://schemas.openxmlformats.org/markup-compatibility/2006">
-          <mc:Choice xmlns:p14="http://schemas.microsoft.com/office/powerpoint/2010/main" Requires="p14">
+        <mc:AlternateContent xmlns:mc="http://schemas.openxmlformats.org/markup-compatibility/2006" xmlns:p14="http://schemas.microsoft.com/office/powerpoint/2010/main">
+          <mc:Choice Requires="p14">
             <p:contentPart p14:bwMode="auto" r:id="rId19">
               <p14:nvContentPartPr>
                 <p14:cNvPr id="20" name="Freihand 19">
@@ -14276,7 +14277,7 @@
               </p14:xfrm>
             </p:contentPart>
           </mc:Choice>
-          <mc:Fallback>
+          <mc:Fallback xmlns="">
             <p:pic>
               <p:nvPicPr>
                 <p:cNvPr id="20" name="Freihand 19">
@@ -14308,8 +14309,8 @@
           </mc:Fallback>
         </mc:AlternateContent>
       </p:grpSp>
-      <mc:AlternateContent xmlns:mc="http://schemas.openxmlformats.org/markup-compatibility/2006">
-        <mc:Choice xmlns:p14="http://schemas.microsoft.com/office/powerpoint/2010/main" Requires="p14">
+      <mc:AlternateContent xmlns:mc="http://schemas.openxmlformats.org/markup-compatibility/2006" xmlns:p14="http://schemas.microsoft.com/office/powerpoint/2010/main">
+        <mc:Choice Requires="p14">
           <p:contentPart p14:bwMode="auto" r:id="rId21">
             <p14:nvContentPartPr>
               <p14:cNvPr id="21" name="Freihand 20">
@@ -14328,7 +14329,7 @@
             </p14:xfrm>
           </p:contentPart>
         </mc:Choice>
-        <mc:Fallback>
+        <mc:Fallback xmlns="">
           <p:pic>
             <p:nvPicPr>
               <p:cNvPr id="21" name="Freihand 20">
@@ -14359,8 +14360,8 @@
           </p:pic>
         </mc:Fallback>
       </mc:AlternateContent>
-      <mc:AlternateContent xmlns:mc="http://schemas.openxmlformats.org/markup-compatibility/2006">
-        <mc:Choice xmlns:p14="http://schemas.microsoft.com/office/powerpoint/2010/main" Requires="p14">
+      <mc:AlternateContent xmlns:mc="http://schemas.openxmlformats.org/markup-compatibility/2006" xmlns:p14="http://schemas.microsoft.com/office/powerpoint/2010/main">
+        <mc:Choice Requires="p14">
           <p:contentPart p14:bwMode="auto" r:id="rId23">
             <p14:nvContentPartPr>
               <p14:cNvPr id="22" name="Freihand 21">
@@ -14379,7 +14380,7 @@
             </p14:xfrm>
           </p:contentPart>
         </mc:Choice>
-        <mc:Fallback>
+        <mc:Fallback xmlns="">
           <p:pic>
             <p:nvPicPr>
               <p:cNvPr id="22" name="Freihand 21">
@@ -14430,8 +14431,8 @@
             <a:chExt cx="100080" cy="113040"/>
           </a:xfrm>
         </p:grpSpPr>
-        <mc:AlternateContent xmlns:mc="http://schemas.openxmlformats.org/markup-compatibility/2006">
-          <mc:Choice xmlns:p14="http://schemas.microsoft.com/office/powerpoint/2010/main" Requires="p14">
+        <mc:AlternateContent xmlns:mc="http://schemas.openxmlformats.org/markup-compatibility/2006" xmlns:p14="http://schemas.microsoft.com/office/powerpoint/2010/main">
+          <mc:Choice Requires="p14">
             <p:contentPart p14:bwMode="auto" r:id="rId25">
               <p14:nvContentPartPr>
                 <p14:cNvPr id="24" name="Freihand 23">
@@ -14450,7 +14451,7 @@
               </p14:xfrm>
             </p:contentPart>
           </mc:Choice>
-          <mc:Fallback>
+          <mc:Fallback xmlns="">
             <p:pic>
               <p:nvPicPr>
                 <p:cNvPr id="24" name="Freihand 23">
@@ -14481,8 +14482,8 @@
             </p:pic>
           </mc:Fallback>
         </mc:AlternateContent>
-        <mc:AlternateContent xmlns:mc="http://schemas.openxmlformats.org/markup-compatibility/2006">
-          <mc:Choice xmlns:p14="http://schemas.microsoft.com/office/powerpoint/2010/main" Requires="p14">
+        <mc:AlternateContent xmlns:mc="http://schemas.openxmlformats.org/markup-compatibility/2006" xmlns:p14="http://schemas.microsoft.com/office/powerpoint/2010/main">
+          <mc:Choice Requires="p14">
             <p:contentPart p14:bwMode="auto" r:id="rId27">
               <p14:nvContentPartPr>
                 <p14:cNvPr id="25" name="Freihand 24">
@@ -14501,7 +14502,7 @@
               </p14:xfrm>
             </p:contentPart>
           </mc:Choice>
-          <mc:Fallback>
+          <mc:Fallback xmlns="">
             <p:pic>
               <p:nvPicPr>
                 <p:cNvPr id="25" name="Freihand 24">
@@ -14532,8 +14533,8 @@
             </p:pic>
           </mc:Fallback>
         </mc:AlternateContent>
-        <mc:AlternateContent xmlns:mc="http://schemas.openxmlformats.org/markup-compatibility/2006">
-          <mc:Choice xmlns:p14="http://schemas.microsoft.com/office/powerpoint/2010/main" Requires="p14">
+        <mc:AlternateContent xmlns:mc="http://schemas.openxmlformats.org/markup-compatibility/2006" xmlns:p14="http://schemas.microsoft.com/office/powerpoint/2010/main">
+          <mc:Choice Requires="p14">
             <p:contentPart p14:bwMode="auto" r:id="rId29">
               <p14:nvContentPartPr>
                 <p14:cNvPr id="26" name="Freihand 25">
@@ -14552,7 +14553,7 @@
               </p14:xfrm>
             </p:contentPart>
           </mc:Choice>
-          <mc:Fallback>
+          <mc:Fallback xmlns="">
             <p:pic>
               <p:nvPicPr>
                 <p:cNvPr id="26" name="Freihand 25">
@@ -14584,8 +14585,8 @@
           </mc:Fallback>
         </mc:AlternateContent>
       </p:grpSp>
-      <mc:AlternateContent xmlns:mc="http://schemas.openxmlformats.org/markup-compatibility/2006">
-        <mc:Choice xmlns:p14="http://schemas.microsoft.com/office/powerpoint/2010/main" Requires="p14">
+      <mc:AlternateContent xmlns:mc="http://schemas.openxmlformats.org/markup-compatibility/2006" xmlns:p14="http://schemas.microsoft.com/office/powerpoint/2010/main">
+        <mc:Choice Requires="p14">
           <p:contentPart p14:bwMode="auto" r:id="rId31">
             <p14:nvContentPartPr>
               <p14:cNvPr id="27" name="Freihand 26">
@@ -14604,7 +14605,7 @@
             </p14:xfrm>
           </p:contentPart>
         </mc:Choice>
-        <mc:Fallback>
+        <mc:Fallback xmlns="">
           <p:pic>
             <p:nvPicPr>
               <p:cNvPr id="27" name="Freihand 26">
@@ -14655,8 +14656,8 @@
             <a:chExt cx="50040" cy="93960"/>
           </a:xfrm>
         </p:grpSpPr>
-        <mc:AlternateContent xmlns:mc="http://schemas.openxmlformats.org/markup-compatibility/2006">
-          <mc:Choice xmlns:p14="http://schemas.microsoft.com/office/powerpoint/2010/main" Requires="p14">
+        <mc:AlternateContent xmlns:mc="http://schemas.openxmlformats.org/markup-compatibility/2006" xmlns:p14="http://schemas.microsoft.com/office/powerpoint/2010/main">
+          <mc:Choice Requires="p14">
             <p:contentPart p14:bwMode="auto" r:id="rId33">
               <p14:nvContentPartPr>
                 <p14:cNvPr id="29" name="Freihand 28">
@@ -14675,7 +14676,7 @@
               </p14:xfrm>
             </p:contentPart>
           </mc:Choice>
-          <mc:Fallback>
+          <mc:Fallback xmlns="">
             <p:pic>
               <p:nvPicPr>
                 <p:cNvPr id="29" name="Freihand 28">
@@ -14706,8 +14707,8 @@
             </p:pic>
           </mc:Fallback>
         </mc:AlternateContent>
-        <mc:AlternateContent xmlns:mc="http://schemas.openxmlformats.org/markup-compatibility/2006">
-          <mc:Choice xmlns:p14="http://schemas.microsoft.com/office/powerpoint/2010/main" Requires="p14">
+        <mc:AlternateContent xmlns:mc="http://schemas.openxmlformats.org/markup-compatibility/2006" xmlns:p14="http://schemas.microsoft.com/office/powerpoint/2010/main">
+          <mc:Choice Requires="p14">
             <p:contentPart p14:bwMode="auto" r:id="rId35">
               <p14:nvContentPartPr>
                 <p14:cNvPr id="30" name="Freihand 29">
@@ -14726,7 +14727,7 @@
               </p14:xfrm>
             </p:contentPart>
           </mc:Choice>
-          <mc:Fallback>
+          <mc:Fallback xmlns="">
             <p:pic>
               <p:nvPicPr>
                 <p:cNvPr id="30" name="Freihand 29">
@@ -14757,8 +14758,8 @@
             </p:pic>
           </mc:Fallback>
         </mc:AlternateContent>
-        <mc:AlternateContent xmlns:mc="http://schemas.openxmlformats.org/markup-compatibility/2006">
-          <mc:Choice xmlns:p14="http://schemas.microsoft.com/office/powerpoint/2010/main" Requires="p14">
+        <mc:AlternateContent xmlns:mc="http://schemas.openxmlformats.org/markup-compatibility/2006" xmlns:p14="http://schemas.microsoft.com/office/powerpoint/2010/main">
+          <mc:Choice Requires="p14">
             <p:contentPart p14:bwMode="auto" r:id="rId37">
               <p14:nvContentPartPr>
                 <p14:cNvPr id="31" name="Freihand 30">
@@ -14777,7 +14778,7 @@
               </p14:xfrm>
             </p:contentPart>
           </mc:Choice>
-          <mc:Fallback>
+          <mc:Fallback xmlns="">
             <p:pic>
               <p:nvPicPr>
                 <p:cNvPr id="31" name="Freihand 30">
@@ -14838,8 +14839,8 @@
           </a:prstGeom>
         </p:spPr>
       </p:pic>
-      <mc:AlternateContent xmlns:mc="http://schemas.openxmlformats.org/markup-compatibility/2006">
-        <mc:Choice xmlns:p14="http://schemas.microsoft.com/office/powerpoint/2010/main" Requires="p14">
+      <mc:AlternateContent xmlns:mc="http://schemas.openxmlformats.org/markup-compatibility/2006" xmlns:p14="http://schemas.microsoft.com/office/powerpoint/2010/main">
+        <mc:Choice Requires="p14">
           <p:contentPart p14:bwMode="auto" r:id="rId40">
             <p14:nvContentPartPr>
               <p14:cNvPr id="33" name="Freihand 32">
@@ -14858,7 +14859,7 @@
             </p14:xfrm>
           </p:contentPart>
         </mc:Choice>
-        <mc:Fallback>
+        <mc:Fallback xmlns="">
           <p:pic>
             <p:nvPicPr>
               <p:cNvPr id="33" name="Freihand 32">
@@ -15230,7 +15231,7 @@
         </p:blipFill>
         <p:spPr>
           <a:xfrm>
-            <a:off x="265274" y="2080077"/>
+            <a:off x="245104" y="2255088"/>
             <a:ext cx="5290915" cy="832009"/>
           </a:xfrm>
           <a:prstGeom prst="rect">
@@ -15242,6 +15243,293 @@
     <p:extLst>
       <p:ext uri="{BB962C8B-B14F-4D97-AF65-F5344CB8AC3E}">
         <p14:creationId xmlns:p14="http://schemas.microsoft.com/office/powerpoint/2010/main" val="3292294678"/>
+      </p:ext>
+    </p:extLst>
+  </p:cSld>
+  <p:clrMapOvr>
+    <a:masterClrMapping/>
+  </p:clrMapOvr>
+</p:sld>
+</file>
+
+<file path=ppt/slides/slide14.xml><?xml version="1.0" encoding="utf-8"?>
+<p:sld xmlns:a="http://schemas.openxmlformats.org/drawingml/2006/main" xmlns:r="http://schemas.openxmlformats.org/officeDocument/2006/relationships" xmlns:p="http://schemas.openxmlformats.org/presentationml/2006/main">
+  <p:cSld>
+    <p:spTree>
+      <p:nvGrpSpPr>
+        <p:cNvPr id="1" name=""/>
+        <p:cNvGrpSpPr/>
+        <p:nvPr/>
+      </p:nvGrpSpPr>
+      <p:grpSpPr>
+        <a:xfrm>
+          <a:off x="0" y="0"/>
+          <a:ext cx="0" cy="0"/>
+          <a:chOff x="0" y="0"/>
+          <a:chExt cx="0" cy="0"/>
+        </a:xfrm>
+      </p:grpSpPr>
+      <p:sp>
+        <p:nvSpPr>
+          <p:cNvPr id="3" name="PlaceHolder 2"/>
+          <p:cNvSpPr>
+            <a:spLocks noGrp="1"/>
+          </p:cNvSpPr>
+          <p:nvPr>
+            <p:ph type="ftr" idx="2"/>
+          </p:nvPr>
+        </p:nvSpPr>
+        <p:spPr/>
+        <p:txBody>
+          <a:bodyPr/>
+          <a:lstStyle/>
+          <a:p>
+            <a:r>
+              <a:rPr dirty="0"/>
+              <a:t>https://github.com/ManuelLerchner/fpv-tutorial-SS23</a:t>
+            </a:r>
+          </a:p>
+        </p:txBody>
+      </p:sp>
+      <p:sp>
+        <p:nvSpPr>
+          <p:cNvPr id="2" name="Titel 1">
+            <a:extLst>
+              <a:ext uri="{FF2B5EF4-FFF2-40B4-BE49-F238E27FC236}">
+                <a16:creationId xmlns:a16="http://schemas.microsoft.com/office/drawing/2014/main" id="{9F895BF8-E7E7-5AE5-172F-D708DE55ACFC}"/>
+              </a:ext>
+            </a:extLst>
+          </p:cNvPr>
+          <p:cNvSpPr>
+            <a:spLocks noGrp="1"/>
+          </p:cNvSpPr>
+          <p:nvPr>
+            <p:ph type="title"/>
+          </p:nvPr>
+        </p:nvSpPr>
+        <p:spPr/>
+        <p:txBody>
+          <a:bodyPr/>
+          <a:lstStyle/>
+          <a:p>
+            <a:r>
+              <a:rPr lang="de-DE" dirty="0"/>
+              <a:t>Tipps für Loop Invarianten</a:t>
+            </a:r>
+          </a:p>
+        </p:txBody>
+      </p:sp>
+      <p:pic>
+        <p:nvPicPr>
+          <p:cNvPr id="9" name="Grafik 8">
+            <a:extLst>
+              <a:ext uri="{FF2B5EF4-FFF2-40B4-BE49-F238E27FC236}">
+                <a16:creationId xmlns:a16="http://schemas.microsoft.com/office/drawing/2014/main" id="{9E499CA6-34A7-684B-E300-1112F00D4562}"/>
+              </a:ext>
+            </a:extLst>
+          </p:cNvPr>
+          <p:cNvPicPr>
+            <a:picLocks noChangeAspect="1"/>
+          </p:cNvPicPr>
+          <p:nvPr/>
+        </p:nvPicPr>
+        <p:blipFill>
+          <a:blip r:embed="rId2"/>
+          <a:stretch>
+            <a:fillRect/>
+          </a:stretch>
+        </p:blipFill>
+        <p:spPr>
+          <a:xfrm>
+            <a:off x="6586554" y="972297"/>
+            <a:ext cx="2451517" cy="3213427"/>
+          </a:xfrm>
+          <a:prstGeom prst="rect">
+            <a:avLst/>
+          </a:prstGeom>
+        </p:spPr>
+      </p:pic>
+      <p:sp>
+        <p:nvSpPr>
+          <p:cNvPr id="11" name="Textfeld 10">
+            <a:extLst>
+              <a:ext uri="{FF2B5EF4-FFF2-40B4-BE49-F238E27FC236}">
+                <a16:creationId xmlns:a16="http://schemas.microsoft.com/office/drawing/2014/main" id="{53C7FB99-CD02-8735-BFA4-C856E9BF9F1F}"/>
+              </a:ext>
+            </a:extLst>
+          </p:cNvPr>
+          <p:cNvSpPr txBox="1"/>
+          <p:nvPr/>
+        </p:nvSpPr>
+        <p:spPr>
+          <a:xfrm>
+            <a:off x="180000" y="1109983"/>
+            <a:ext cx="6390363" cy="307777"/>
+          </a:xfrm>
+          <a:prstGeom prst="rect">
+            <a:avLst/>
+          </a:prstGeom>
+          <a:noFill/>
+        </p:spPr>
+        <p:txBody>
+          <a:bodyPr wrap="square">
+            <a:spAutoFit/>
+          </a:bodyPr>
+          <a:lstStyle/>
+          <a:p>
+            <a:r>
+              <a:rPr lang="de-DE" sz="1400" dirty="0">
+                <a:solidFill>
+                  <a:schemeClr val="tx2">
+                    <a:lumMod val="60000"/>
+                    <a:lumOff val="40000"/>
+                  </a:schemeClr>
+                </a:solidFill>
+                <a:hlinkClick r:id="rId3">
+                  <a:extLst>
+                    <a:ext uri="{A12FA001-AC4F-418D-AE19-62706E023703}">
+                      <ahyp:hlinkClr xmlns:ahyp="http://schemas.microsoft.com/office/drawing/2018/hyperlinkcolor" val="tx"/>
+                    </a:ext>
+                  </a:extLst>
+                </a:hlinkClick>
+              </a:rPr>
+              <a:t>https://ttt.in.tum.de/recordings/Info2_2017_11_24-1/Info2_2017_11_24-1.mp4</a:t>
+            </a:r>
+            <a:endParaRPr lang="de-DE" sz="1400" dirty="0">
+              <a:solidFill>
+                <a:schemeClr val="tx2">
+                  <a:lumMod val="60000"/>
+                  <a:lumOff val="40000"/>
+                </a:schemeClr>
+              </a:solidFill>
+            </a:endParaRPr>
+          </a:p>
+        </p:txBody>
+      </p:sp>
+      <p:pic>
+        <p:nvPicPr>
+          <p:cNvPr id="5" name="Grafik 4">
+            <a:extLst>
+              <a:ext uri="{FF2B5EF4-FFF2-40B4-BE49-F238E27FC236}">
+                <a16:creationId xmlns:a16="http://schemas.microsoft.com/office/drawing/2014/main" id="{A18A5ACE-0210-1F51-C000-18B728D504C9}"/>
+              </a:ext>
+            </a:extLst>
+          </p:cNvPr>
+          <p:cNvPicPr>
+            <a:picLocks noChangeAspect="1"/>
+          </p:cNvPicPr>
+          <p:nvPr/>
+        </p:nvPicPr>
+        <p:blipFill>
+          <a:blip r:embed="rId4"/>
+          <a:stretch>
+            <a:fillRect/>
+          </a:stretch>
+        </p:blipFill>
+        <p:spPr>
+          <a:xfrm>
+            <a:off x="297642" y="1519119"/>
+            <a:ext cx="3403756" cy="868776"/>
+          </a:xfrm>
+          <a:prstGeom prst="rect">
+            <a:avLst/>
+          </a:prstGeom>
+        </p:spPr>
+      </p:pic>
+      <p:pic>
+        <p:nvPicPr>
+          <p:cNvPr id="7" name="Grafik 6">
+            <a:extLst>
+              <a:ext uri="{FF2B5EF4-FFF2-40B4-BE49-F238E27FC236}">
+                <a16:creationId xmlns:a16="http://schemas.microsoft.com/office/drawing/2014/main" id="{C0A2495A-DA4F-6BF3-CE66-EEBC671A023E}"/>
+              </a:ext>
+            </a:extLst>
+          </p:cNvPr>
+          <p:cNvPicPr>
+            <a:picLocks noChangeAspect="1"/>
+          </p:cNvPicPr>
+          <p:nvPr/>
+        </p:nvPicPr>
+        <p:blipFill>
+          <a:blip r:embed="rId5"/>
+          <a:stretch>
+            <a:fillRect/>
+          </a:stretch>
+        </p:blipFill>
+        <p:spPr>
+          <a:xfrm>
+            <a:off x="297642" y="3383212"/>
+            <a:ext cx="3403756" cy="1347233"/>
+          </a:xfrm>
+          <a:prstGeom prst="rect">
+            <a:avLst/>
+          </a:prstGeom>
+        </p:spPr>
+      </p:pic>
+      <p:pic>
+        <p:nvPicPr>
+          <p:cNvPr id="14" name="Grafik 13">
+            <a:extLst>
+              <a:ext uri="{FF2B5EF4-FFF2-40B4-BE49-F238E27FC236}">
+                <a16:creationId xmlns:a16="http://schemas.microsoft.com/office/drawing/2014/main" id="{740EE327-85AB-FD92-792F-60917D429BFF}"/>
+              </a:ext>
+            </a:extLst>
+          </p:cNvPr>
+          <p:cNvPicPr>
+            <a:picLocks noChangeAspect="1"/>
+          </p:cNvPicPr>
+          <p:nvPr/>
+        </p:nvPicPr>
+        <p:blipFill>
+          <a:blip r:embed="rId6"/>
+          <a:stretch>
+            <a:fillRect/>
+          </a:stretch>
+        </p:blipFill>
+        <p:spPr>
+          <a:xfrm>
+            <a:off x="313833" y="2489254"/>
+            <a:ext cx="3311422" cy="893958"/>
+          </a:xfrm>
+          <a:prstGeom prst="rect">
+            <a:avLst/>
+          </a:prstGeom>
+        </p:spPr>
+      </p:pic>
+      <p:pic>
+        <p:nvPicPr>
+          <p:cNvPr id="17" name="Grafik 16">
+            <a:extLst>
+              <a:ext uri="{FF2B5EF4-FFF2-40B4-BE49-F238E27FC236}">
+                <a16:creationId xmlns:a16="http://schemas.microsoft.com/office/drawing/2014/main" id="{0AEBB848-7AA3-7F12-4AFC-C37F43B2A3B5}"/>
+              </a:ext>
+            </a:extLst>
+          </p:cNvPr>
+          <p:cNvPicPr>
+            <a:picLocks noChangeAspect="1"/>
+          </p:cNvPicPr>
+          <p:nvPr/>
+        </p:nvPicPr>
+        <p:blipFill>
+          <a:blip r:embed="rId7"/>
+          <a:stretch>
+            <a:fillRect/>
+          </a:stretch>
+        </p:blipFill>
+        <p:spPr>
+          <a:xfrm>
+            <a:off x="6494881" y="4340013"/>
+            <a:ext cx="2433368" cy="253841"/>
+          </a:xfrm>
+          <a:prstGeom prst="rect">
+            <a:avLst/>
+          </a:prstGeom>
+        </p:spPr>
+      </p:pic>
+    </p:spTree>
+    <p:extLst>
+      <p:ext uri="{BB962C8B-B14F-4D97-AF65-F5344CB8AC3E}">
+        <p14:creationId xmlns:p14="http://schemas.microsoft.com/office/powerpoint/2010/main" val="1992722206"/>
       </p:ext>
     </p:extLst>
   </p:cSld>
@@ -15724,8 +16012,8 @@
             <a:chExt cx="875880" cy="172800"/>
           </a:xfrm>
         </p:grpSpPr>
-        <mc:AlternateContent xmlns:mc="http://schemas.openxmlformats.org/markup-compatibility/2006">
-          <mc:Choice xmlns:p14="http://schemas.microsoft.com/office/powerpoint/2010/main" Requires="p14">
+        <mc:AlternateContent xmlns:mc="http://schemas.openxmlformats.org/markup-compatibility/2006" xmlns:p14="http://schemas.microsoft.com/office/powerpoint/2010/main">
+          <mc:Choice Requires="p14">
             <p:contentPart p14:bwMode="auto" r:id="rId7">
               <p14:nvContentPartPr>
                 <p14:cNvPr id="21" name="Freihand 20">
@@ -15744,7 +16032,7 @@
               </p14:xfrm>
             </p:contentPart>
           </mc:Choice>
-          <mc:Fallback>
+          <mc:Fallback xmlns="">
             <p:pic>
               <p:nvPicPr>
                 <p:cNvPr id="21" name="Freihand 20">
@@ -15775,8 +16063,8 @@
             </p:pic>
           </mc:Fallback>
         </mc:AlternateContent>
-        <mc:AlternateContent xmlns:mc="http://schemas.openxmlformats.org/markup-compatibility/2006">
-          <mc:Choice xmlns:p14="http://schemas.microsoft.com/office/powerpoint/2010/main" Requires="p14">
+        <mc:AlternateContent xmlns:mc="http://schemas.openxmlformats.org/markup-compatibility/2006" xmlns:p14="http://schemas.microsoft.com/office/powerpoint/2010/main">
+          <mc:Choice Requires="p14">
             <p:contentPart p14:bwMode="auto" r:id="rId9">
               <p14:nvContentPartPr>
                 <p14:cNvPr id="22" name="Freihand 21">
@@ -15795,7 +16083,7 @@
               </p14:xfrm>
             </p:contentPart>
           </mc:Choice>
-          <mc:Fallback>
+          <mc:Fallback xmlns="">
             <p:pic>
               <p:nvPicPr>
                 <p:cNvPr id="22" name="Freihand 21">
@@ -15826,8 +16114,8 @@
             </p:pic>
           </mc:Fallback>
         </mc:AlternateContent>
-        <mc:AlternateContent xmlns:mc="http://schemas.openxmlformats.org/markup-compatibility/2006">
-          <mc:Choice xmlns:p14="http://schemas.microsoft.com/office/powerpoint/2010/main" Requires="p14">
+        <mc:AlternateContent xmlns:mc="http://schemas.openxmlformats.org/markup-compatibility/2006" xmlns:p14="http://schemas.microsoft.com/office/powerpoint/2010/main">
+          <mc:Choice Requires="p14">
             <p:contentPart p14:bwMode="auto" r:id="rId11">
               <p14:nvContentPartPr>
                 <p14:cNvPr id="23" name="Freihand 22">
@@ -15846,7 +16134,7 @@
               </p14:xfrm>
             </p:contentPart>
           </mc:Choice>
-          <mc:Fallback>
+          <mc:Fallback xmlns="">
             <p:pic>
               <p:nvPicPr>
                 <p:cNvPr id="23" name="Freihand 22">
@@ -15877,8 +16165,8 @@
             </p:pic>
           </mc:Fallback>
         </mc:AlternateContent>
-        <mc:AlternateContent xmlns:mc="http://schemas.openxmlformats.org/markup-compatibility/2006">
-          <mc:Choice xmlns:p14="http://schemas.microsoft.com/office/powerpoint/2010/main" Requires="p14">
+        <mc:AlternateContent xmlns:mc="http://schemas.openxmlformats.org/markup-compatibility/2006" xmlns:p14="http://schemas.microsoft.com/office/powerpoint/2010/main">
+          <mc:Choice Requires="p14">
             <p:contentPart p14:bwMode="auto" r:id="rId13">
               <p14:nvContentPartPr>
                 <p14:cNvPr id="24" name="Freihand 23">
@@ -15897,7 +16185,7 @@
               </p14:xfrm>
             </p:contentPart>
           </mc:Choice>
-          <mc:Fallback>
+          <mc:Fallback xmlns="">
             <p:pic>
               <p:nvPicPr>
                 <p:cNvPr id="24" name="Freihand 23">
@@ -15928,8 +16216,8 @@
             </p:pic>
           </mc:Fallback>
         </mc:AlternateContent>
-        <mc:AlternateContent xmlns:mc="http://schemas.openxmlformats.org/markup-compatibility/2006">
-          <mc:Choice xmlns:p14="http://schemas.microsoft.com/office/powerpoint/2010/main" Requires="p14">
+        <mc:AlternateContent xmlns:mc="http://schemas.openxmlformats.org/markup-compatibility/2006" xmlns:p14="http://schemas.microsoft.com/office/powerpoint/2010/main">
+          <mc:Choice Requires="p14">
             <p:contentPart p14:bwMode="auto" r:id="rId15">
               <p14:nvContentPartPr>
                 <p14:cNvPr id="25" name="Freihand 24">
@@ -15948,7 +16236,7 @@
               </p14:xfrm>
             </p:contentPart>
           </mc:Choice>
-          <mc:Fallback>
+          <mc:Fallback xmlns="">
             <p:pic>
               <p:nvPicPr>
                 <p:cNvPr id="25" name="Freihand 24">
@@ -15979,8 +16267,8 @@
             </p:pic>
           </mc:Fallback>
         </mc:AlternateContent>
-        <mc:AlternateContent xmlns:mc="http://schemas.openxmlformats.org/markup-compatibility/2006">
-          <mc:Choice xmlns:p14="http://schemas.microsoft.com/office/powerpoint/2010/main" Requires="p14">
+        <mc:AlternateContent xmlns:mc="http://schemas.openxmlformats.org/markup-compatibility/2006" xmlns:p14="http://schemas.microsoft.com/office/powerpoint/2010/main">
+          <mc:Choice Requires="p14">
             <p:contentPart p14:bwMode="auto" r:id="rId17">
               <p14:nvContentPartPr>
                 <p14:cNvPr id="26" name="Freihand 25">
@@ -15999,7 +16287,7 @@
               </p14:xfrm>
             </p:contentPart>
           </mc:Choice>
-          <mc:Fallback>
+          <mc:Fallback xmlns="">
             <p:pic>
               <p:nvPicPr>
                 <p:cNvPr id="26" name="Freihand 25">
@@ -16030,8 +16318,8 @@
             </p:pic>
           </mc:Fallback>
         </mc:AlternateContent>
-        <mc:AlternateContent xmlns:mc="http://schemas.openxmlformats.org/markup-compatibility/2006">
-          <mc:Choice xmlns:p14="http://schemas.microsoft.com/office/powerpoint/2010/main" Requires="p14">
+        <mc:AlternateContent xmlns:mc="http://schemas.openxmlformats.org/markup-compatibility/2006" xmlns:p14="http://schemas.microsoft.com/office/powerpoint/2010/main">
+          <mc:Choice Requires="p14">
             <p:contentPart p14:bwMode="auto" r:id="rId19">
               <p14:nvContentPartPr>
                 <p14:cNvPr id="27" name="Freihand 26">
@@ -16050,7 +16338,7 @@
               </p14:xfrm>
             </p:contentPart>
           </mc:Choice>
-          <mc:Fallback>
+          <mc:Fallback xmlns="">
             <p:pic>
               <p:nvPicPr>
                 <p:cNvPr id="27" name="Freihand 26">
@@ -16081,8 +16369,8 @@
             </p:pic>
           </mc:Fallback>
         </mc:AlternateContent>
-        <mc:AlternateContent xmlns:mc="http://schemas.openxmlformats.org/markup-compatibility/2006">
-          <mc:Choice xmlns:p14="http://schemas.microsoft.com/office/powerpoint/2010/main" Requires="p14">
+        <mc:AlternateContent xmlns:mc="http://schemas.openxmlformats.org/markup-compatibility/2006" xmlns:p14="http://schemas.microsoft.com/office/powerpoint/2010/main">
+          <mc:Choice Requires="p14">
             <p:contentPart p14:bwMode="auto" r:id="rId21">
               <p14:nvContentPartPr>
                 <p14:cNvPr id="28" name="Freihand 27">
@@ -16101,7 +16389,7 @@
               </p14:xfrm>
             </p:contentPart>
           </mc:Choice>
-          <mc:Fallback>
+          <mc:Fallback xmlns="">
             <p:pic>
               <p:nvPicPr>
                 <p:cNvPr id="28" name="Freihand 27">
@@ -16132,8 +16420,8 @@
             </p:pic>
           </mc:Fallback>
         </mc:AlternateContent>
-        <mc:AlternateContent xmlns:mc="http://schemas.openxmlformats.org/markup-compatibility/2006">
-          <mc:Choice xmlns:p14="http://schemas.microsoft.com/office/powerpoint/2010/main" Requires="p14">
+        <mc:AlternateContent xmlns:mc="http://schemas.openxmlformats.org/markup-compatibility/2006" xmlns:p14="http://schemas.microsoft.com/office/powerpoint/2010/main">
+          <mc:Choice Requires="p14">
             <p:contentPart p14:bwMode="auto" r:id="rId23">
               <p14:nvContentPartPr>
                 <p14:cNvPr id="29" name="Freihand 28">
@@ -16152,7 +16440,7 @@
               </p14:xfrm>
             </p:contentPart>
           </mc:Choice>
-          <mc:Fallback>
+          <mc:Fallback xmlns="">
             <p:pic>
               <p:nvPicPr>
                 <p:cNvPr id="29" name="Freihand 28">
@@ -16204,8 +16492,8 @@
             <a:chExt cx="554760" cy="230400"/>
           </a:xfrm>
         </p:grpSpPr>
-        <mc:AlternateContent xmlns:mc="http://schemas.openxmlformats.org/markup-compatibility/2006">
-          <mc:Choice xmlns:p14="http://schemas.microsoft.com/office/powerpoint/2010/main" Requires="p14">
+        <mc:AlternateContent xmlns:mc="http://schemas.openxmlformats.org/markup-compatibility/2006" xmlns:p14="http://schemas.microsoft.com/office/powerpoint/2010/main">
+          <mc:Choice Requires="p14">
             <p:contentPart p14:bwMode="auto" r:id="rId25">
               <p14:nvContentPartPr>
                 <p14:cNvPr id="31" name="Freihand 30">
@@ -16224,7 +16512,7 @@
               </p14:xfrm>
             </p:contentPart>
           </mc:Choice>
-          <mc:Fallback>
+          <mc:Fallback xmlns="">
             <p:pic>
               <p:nvPicPr>
                 <p:cNvPr id="31" name="Freihand 30">
@@ -16255,8 +16543,8 @@
             </p:pic>
           </mc:Fallback>
         </mc:AlternateContent>
-        <mc:AlternateContent xmlns:mc="http://schemas.openxmlformats.org/markup-compatibility/2006">
-          <mc:Choice xmlns:p14="http://schemas.microsoft.com/office/powerpoint/2010/main" Requires="p14">
+        <mc:AlternateContent xmlns:mc="http://schemas.openxmlformats.org/markup-compatibility/2006" xmlns:p14="http://schemas.microsoft.com/office/powerpoint/2010/main">
+          <mc:Choice Requires="p14">
             <p:contentPart p14:bwMode="auto" r:id="rId27">
               <p14:nvContentPartPr>
                 <p14:cNvPr id="32" name="Freihand 31">
@@ -16275,7 +16563,7 @@
               </p14:xfrm>
             </p:contentPart>
           </mc:Choice>
-          <mc:Fallback>
+          <mc:Fallback xmlns="">
             <p:pic>
               <p:nvPicPr>
                 <p:cNvPr id="32" name="Freihand 31">
@@ -16306,8 +16594,8 @@
             </p:pic>
           </mc:Fallback>
         </mc:AlternateContent>
-        <mc:AlternateContent xmlns:mc="http://schemas.openxmlformats.org/markup-compatibility/2006">
-          <mc:Choice xmlns:p14="http://schemas.microsoft.com/office/powerpoint/2010/main" Requires="p14">
+        <mc:AlternateContent xmlns:mc="http://schemas.openxmlformats.org/markup-compatibility/2006" xmlns:p14="http://schemas.microsoft.com/office/powerpoint/2010/main">
+          <mc:Choice Requires="p14">
             <p:contentPart p14:bwMode="auto" r:id="rId29">
               <p14:nvContentPartPr>
                 <p14:cNvPr id="33" name="Freihand 32">
@@ -16326,7 +16614,7 @@
               </p14:xfrm>
             </p:contentPart>
           </mc:Choice>
-          <mc:Fallback>
+          <mc:Fallback xmlns="">
             <p:pic>
               <p:nvPicPr>
                 <p:cNvPr id="33" name="Freihand 32">
@@ -16357,8 +16645,8 @@
             </p:pic>
           </mc:Fallback>
         </mc:AlternateContent>
-        <mc:AlternateContent xmlns:mc="http://schemas.openxmlformats.org/markup-compatibility/2006">
-          <mc:Choice xmlns:p14="http://schemas.microsoft.com/office/powerpoint/2010/main" Requires="p14">
+        <mc:AlternateContent xmlns:mc="http://schemas.openxmlformats.org/markup-compatibility/2006" xmlns:p14="http://schemas.microsoft.com/office/powerpoint/2010/main">
+          <mc:Choice Requires="p14">
             <p:contentPart p14:bwMode="auto" r:id="rId31">
               <p14:nvContentPartPr>
                 <p14:cNvPr id="35" name="Freihand 34">
@@ -16377,7 +16665,7 @@
               </p14:xfrm>
             </p:contentPart>
           </mc:Choice>
-          <mc:Fallback>
+          <mc:Fallback xmlns="">
             <p:pic>
               <p:nvPicPr>
                 <p:cNvPr id="35" name="Freihand 34">
@@ -16408,8 +16696,8 @@
             </p:pic>
           </mc:Fallback>
         </mc:AlternateContent>
-        <mc:AlternateContent xmlns:mc="http://schemas.openxmlformats.org/markup-compatibility/2006">
-          <mc:Choice xmlns:p14="http://schemas.microsoft.com/office/powerpoint/2010/main" Requires="p14">
+        <mc:AlternateContent xmlns:mc="http://schemas.openxmlformats.org/markup-compatibility/2006" xmlns:p14="http://schemas.microsoft.com/office/powerpoint/2010/main">
+          <mc:Choice Requires="p14">
             <p:contentPart p14:bwMode="auto" r:id="rId33">
               <p14:nvContentPartPr>
                 <p14:cNvPr id="36" name="Freihand 35">
@@ -16428,7 +16716,7 @@
               </p14:xfrm>
             </p:contentPart>
           </mc:Choice>
-          <mc:Fallback>
+          <mc:Fallback xmlns="">
             <p:pic>
               <p:nvPicPr>
                 <p:cNvPr id="36" name="Freihand 35">
@@ -16459,8 +16747,8 @@
             </p:pic>
           </mc:Fallback>
         </mc:AlternateContent>
-        <mc:AlternateContent xmlns:mc="http://schemas.openxmlformats.org/markup-compatibility/2006">
-          <mc:Choice xmlns:p14="http://schemas.microsoft.com/office/powerpoint/2010/main" Requires="p14">
+        <mc:AlternateContent xmlns:mc="http://schemas.openxmlformats.org/markup-compatibility/2006" xmlns:p14="http://schemas.microsoft.com/office/powerpoint/2010/main">
+          <mc:Choice Requires="p14">
             <p:contentPart p14:bwMode="auto" r:id="rId35">
               <p14:nvContentPartPr>
                 <p14:cNvPr id="37" name="Freihand 36">
@@ -16479,7 +16767,7 @@
               </p14:xfrm>
             </p:contentPart>
           </mc:Choice>
-          <mc:Fallback>
+          <mc:Fallback xmlns="">
             <p:pic>
               <p:nvPicPr>
                 <p:cNvPr id="37" name="Freihand 36">
@@ -17533,8 +17821,8 @@
             <a:chExt cx="54720" cy="96840"/>
           </a:xfrm>
         </p:grpSpPr>
-        <mc:AlternateContent xmlns:mc="http://schemas.openxmlformats.org/markup-compatibility/2006">
-          <mc:Choice xmlns:p14="http://schemas.microsoft.com/office/powerpoint/2010/main" Requires="p14">
+        <mc:AlternateContent xmlns:mc="http://schemas.openxmlformats.org/markup-compatibility/2006" xmlns:p14="http://schemas.microsoft.com/office/powerpoint/2010/main">
+          <mc:Choice Requires="p14">
             <p:contentPart p14:bwMode="auto" r:id="rId4">
               <p14:nvContentPartPr>
                 <p14:cNvPr id="64" name="Freihand 63">
@@ -17553,7 +17841,7 @@
               </p14:xfrm>
             </p:contentPart>
           </mc:Choice>
-          <mc:Fallback>
+          <mc:Fallback xmlns="">
             <p:pic>
               <p:nvPicPr>
                 <p:cNvPr id="64" name="Freihand 63">
@@ -17584,8 +17872,8 @@
             </p:pic>
           </mc:Fallback>
         </mc:AlternateContent>
-        <mc:AlternateContent xmlns:mc="http://schemas.openxmlformats.org/markup-compatibility/2006">
-          <mc:Choice xmlns:p14="http://schemas.microsoft.com/office/powerpoint/2010/main" Requires="p14">
+        <mc:AlternateContent xmlns:mc="http://schemas.openxmlformats.org/markup-compatibility/2006" xmlns:p14="http://schemas.microsoft.com/office/powerpoint/2010/main">
+          <mc:Choice Requires="p14">
             <p:contentPart p14:bwMode="auto" r:id="rId6">
               <p14:nvContentPartPr>
                 <p14:cNvPr id="65" name="Freihand 64">
@@ -17604,7 +17892,7 @@
               </p14:xfrm>
             </p:contentPart>
           </mc:Choice>
-          <mc:Fallback>
+          <mc:Fallback xmlns="">
             <p:pic>
               <p:nvPicPr>
                 <p:cNvPr id="65" name="Freihand 64">
@@ -17656,8 +17944,8 @@
             <a:chExt cx="77760" cy="106560"/>
           </a:xfrm>
         </p:grpSpPr>
-        <mc:AlternateContent xmlns:mc="http://schemas.openxmlformats.org/markup-compatibility/2006">
-          <mc:Choice xmlns:p14="http://schemas.microsoft.com/office/powerpoint/2010/main" Requires="p14">
+        <mc:AlternateContent xmlns:mc="http://schemas.openxmlformats.org/markup-compatibility/2006" xmlns:p14="http://schemas.microsoft.com/office/powerpoint/2010/main">
+          <mc:Choice Requires="p14">
             <p:contentPart p14:bwMode="auto" r:id="rId8">
               <p14:nvContentPartPr>
                 <p14:cNvPr id="67" name="Freihand 66">
@@ -17676,7 +17964,7 @@
               </p14:xfrm>
             </p:contentPart>
           </mc:Choice>
-          <mc:Fallback>
+          <mc:Fallback xmlns="">
             <p:pic>
               <p:nvPicPr>
                 <p:cNvPr id="67" name="Freihand 66">
@@ -17707,8 +17995,8 @@
             </p:pic>
           </mc:Fallback>
         </mc:AlternateContent>
-        <mc:AlternateContent xmlns:mc="http://schemas.openxmlformats.org/markup-compatibility/2006">
-          <mc:Choice xmlns:p14="http://schemas.microsoft.com/office/powerpoint/2010/main" Requires="p14">
+        <mc:AlternateContent xmlns:mc="http://schemas.openxmlformats.org/markup-compatibility/2006" xmlns:p14="http://schemas.microsoft.com/office/powerpoint/2010/main">
+          <mc:Choice Requires="p14">
             <p:contentPart p14:bwMode="auto" r:id="rId10">
               <p14:nvContentPartPr>
                 <p14:cNvPr id="68" name="Freihand 67">
@@ -17727,7 +18015,7 @@
               </p14:xfrm>
             </p:contentPart>
           </mc:Choice>
-          <mc:Fallback>
+          <mc:Fallback xmlns="">
             <p:pic>
               <p:nvPicPr>
                 <p:cNvPr id="68" name="Freihand 67">
@@ -17779,8 +18067,8 @@
             <a:chExt cx="97200" cy="122040"/>
           </a:xfrm>
         </p:grpSpPr>
-        <mc:AlternateContent xmlns:mc="http://schemas.openxmlformats.org/markup-compatibility/2006">
-          <mc:Choice xmlns:p14="http://schemas.microsoft.com/office/powerpoint/2010/main" Requires="p14">
+        <mc:AlternateContent xmlns:mc="http://schemas.openxmlformats.org/markup-compatibility/2006" xmlns:p14="http://schemas.microsoft.com/office/powerpoint/2010/main">
+          <mc:Choice Requires="p14">
             <p:contentPart p14:bwMode="auto" r:id="rId12">
               <p14:nvContentPartPr>
                 <p14:cNvPr id="75" name="Freihand 74">
@@ -17799,7 +18087,7 @@
               </p14:xfrm>
             </p:contentPart>
           </mc:Choice>
-          <mc:Fallback>
+          <mc:Fallback xmlns="">
             <p:pic>
               <p:nvPicPr>
                 <p:cNvPr id="75" name="Freihand 74">
@@ -17830,8 +18118,8 @@
             </p:pic>
           </mc:Fallback>
         </mc:AlternateContent>
-        <mc:AlternateContent xmlns:mc="http://schemas.openxmlformats.org/markup-compatibility/2006">
-          <mc:Choice xmlns:p14="http://schemas.microsoft.com/office/powerpoint/2010/main" Requires="p14">
+        <mc:AlternateContent xmlns:mc="http://schemas.openxmlformats.org/markup-compatibility/2006" xmlns:p14="http://schemas.microsoft.com/office/powerpoint/2010/main">
+          <mc:Choice Requires="p14">
             <p:contentPart p14:bwMode="auto" r:id="rId14">
               <p14:nvContentPartPr>
                 <p14:cNvPr id="76" name="Freihand 75">
@@ -17850,7 +18138,7 @@
               </p14:xfrm>
             </p:contentPart>
           </mc:Choice>
-          <mc:Fallback>
+          <mc:Fallback xmlns="">
             <p:pic>
               <p:nvPicPr>
                 <p:cNvPr id="76" name="Freihand 75">
@@ -17882,8 +18170,8 @@
           </mc:Fallback>
         </mc:AlternateContent>
       </p:grpSp>
-      <mc:AlternateContent xmlns:mc="http://schemas.openxmlformats.org/markup-compatibility/2006">
-        <mc:Choice xmlns:p14="http://schemas.microsoft.com/office/powerpoint/2010/main" Requires="p14">
+      <mc:AlternateContent xmlns:mc="http://schemas.openxmlformats.org/markup-compatibility/2006" xmlns:p14="http://schemas.microsoft.com/office/powerpoint/2010/main">
+        <mc:Choice Requires="p14">
           <p:contentPart p14:bwMode="auto" r:id="rId16">
             <p14:nvContentPartPr>
               <p14:cNvPr id="78" name="Freihand 77">
@@ -17902,7 +18190,7 @@
             </p14:xfrm>
           </p:contentPart>
         </mc:Choice>
-        <mc:Fallback>
+        <mc:Fallback xmlns="">
           <p:pic>
             <p:nvPicPr>
               <p:cNvPr id="78" name="Freihand 77">
@@ -17953,8 +18241,8 @@
             <a:chExt cx="74880" cy="72000"/>
           </a:xfrm>
         </p:grpSpPr>
-        <mc:AlternateContent xmlns:mc="http://schemas.openxmlformats.org/markup-compatibility/2006">
-          <mc:Choice xmlns:p14="http://schemas.microsoft.com/office/powerpoint/2010/main" Requires="p14">
+        <mc:AlternateContent xmlns:mc="http://schemas.openxmlformats.org/markup-compatibility/2006" xmlns:p14="http://schemas.microsoft.com/office/powerpoint/2010/main">
+          <mc:Choice Requires="p14">
             <p:contentPart p14:bwMode="auto" r:id="rId18">
               <p14:nvContentPartPr>
                 <p14:cNvPr id="79" name="Freihand 78">
@@ -17973,7 +18261,7 @@
               </p14:xfrm>
             </p:contentPart>
           </mc:Choice>
-          <mc:Fallback>
+          <mc:Fallback xmlns="">
             <p:pic>
               <p:nvPicPr>
                 <p:cNvPr id="79" name="Freihand 78">
@@ -18004,8 +18292,8 @@
             </p:pic>
           </mc:Fallback>
         </mc:AlternateContent>
-        <mc:AlternateContent xmlns:mc="http://schemas.openxmlformats.org/markup-compatibility/2006">
-          <mc:Choice xmlns:p14="http://schemas.microsoft.com/office/powerpoint/2010/main" Requires="p14">
+        <mc:AlternateContent xmlns:mc="http://schemas.openxmlformats.org/markup-compatibility/2006" xmlns:p14="http://schemas.microsoft.com/office/powerpoint/2010/main">
+          <mc:Choice Requires="p14">
             <p:contentPart p14:bwMode="auto" r:id="rId20">
               <p14:nvContentPartPr>
                 <p14:cNvPr id="80" name="Freihand 79">
@@ -18024,7 +18312,7 @@
               </p14:xfrm>
             </p:contentPart>
           </mc:Choice>
-          <mc:Fallback>
+          <mc:Fallback xmlns="">
             <p:pic>
               <p:nvPicPr>
                 <p:cNvPr id="80" name="Freihand 79">
@@ -18056,8 +18344,8 @@
           </mc:Fallback>
         </mc:AlternateContent>
       </p:grpSp>
-      <mc:AlternateContent xmlns:mc="http://schemas.openxmlformats.org/markup-compatibility/2006">
-        <mc:Choice xmlns:p14="http://schemas.microsoft.com/office/powerpoint/2010/main" Requires="p14">
+      <mc:AlternateContent xmlns:mc="http://schemas.openxmlformats.org/markup-compatibility/2006" xmlns:p14="http://schemas.microsoft.com/office/powerpoint/2010/main">
+        <mc:Choice Requires="p14">
           <p:contentPart p14:bwMode="auto" r:id="rId22">
             <p14:nvContentPartPr>
               <p14:cNvPr id="82" name="Freihand 81">
@@ -18076,7 +18364,7 @@
             </p14:xfrm>
           </p:contentPart>
         </mc:Choice>
-        <mc:Fallback>
+        <mc:Fallback xmlns="">
           <p:pic>
             <p:nvPicPr>
               <p:cNvPr id="82" name="Freihand 81">
@@ -18107,8 +18395,8 @@
           </p:pic>
         </mc:Fallback>
       </mc:AlternateContent>
-      <mc:AlternateContent xmlns:mc="http://schemas.openxmlformats.org/markup-compatibility/2006">
-        <mc:Choice xmlns:p14="http://schemas.microsoft.com/office/powerpoint/2010/main" Requires="p14">
+      <mc:AlternateContent xmlns:mc="http://schemas.openxmlformats.org/markup-compatibility/2006" xmlns:p14="http://schemas.microsoft.com/office/powerpoint/2010/main">
+        <mc:Choice Requires="p14">
           <p:contentPart p14:bwMode="auto" r:id="rId24">
             <p14:nvContentPartPr>
               <p14:cNvPr id="83" name="Freihand 82">
@@ -18127,7 +18415,7 @@
             </p14:xfrm>
           </p:contentPart>
         </mc:Choice>
-        <mc:Fallback>
+        <mc:Fallback xmlns="">
           <p:pic>
             <p:nvPicPr>
               <p:cNvPr id="83" name="Freihand 82">
@@ -18178,8 +18466,8 @@
             <a:chExt cx="100080" cy="113040"/>
           </a:xfrm>
         </p:grpSpPr>
-        <mc:AlternateContent xmlns:mc="http://schemas.openxmlformats.org/markup-compatibility/2006">
-          <mc:Choice xmlns:p14="http://schemas.microsoft.com/office/powerpoint/2010/main" Requires="p14">
+        <mc:AlternateContent xmlns:mc="http://schemas.openxmlformats.org/markup-compatibility/2006" xmlns:p14="http://schemas.microsoft.com/office/powerpoint/2010/main">
+          <mc:Choice Requires="p14">
             <p:contentPart p14:bwMode="auto" r:id="rId26">
               <p14:nvContentPartPr>
                 <p14:cNvPr id="84" name="Freihand 83">
@@ -18198,7 +18486,7 @@
               </p14:xfrm>
             </p:contentPart>
           </mc:Choice>
-          <mc:Fallback>
+          <mc:Fallback xmlns="">
             <p:pic>
               <p:nvPicPr>
                 <p:cNvPr id="84" name="Freihand 83">
@@ -18229,8 +18517,8 @@
             </p:pic>
           </mc:Fallback>
         </mc:AlternateContent>
-        <mc:AlternateContent xmlns:mc="http://schemas.openxmlformats.org/markup-compatibility/2006">
-          <mc:Choice xmlns:p14="http://schemas.microsoft.com/office/powerpoint/2010/main" Requires="p14">
+        <mc:AlternateContent xmlns:mc="http://schemas.openxmlformats.org/markup-compatibility/2006" xmlns:p14="http://schemas.microsoft.com/office/powerpoint/2010/main">
+          <mc:Choice Requires="p14">
             <p:contentPart p14:bwMode="auto" r:id="rId28">
               <p14:nvContentPartPr>
                 <p14:cNvPr id="85" name="Freihand 84">
@@ -18249,7 +18537,7 @@
               </p14:xfrm>
             </p:contentPart>
           </mc:Choice>
-          <mc:Fallback>
+          <mc:Fallback xmlns="">
             <p:pic>
               <p:nvPicPr>
                 <p:cNvPr id="85" name="Freihand 84">
@@ -18280,8 +18568,8 @@
             </p:pic>
           </mc:Fallback>
         </mc:AlternateContent>
-        <mc:AlternateContent xmlns:mc="http://schemas.openxmlformats.org/markup-compatibility/2006">
-          <mc:Choice xmlns:p14="http://schemas.microsoft.com/office/powerpoint/2010/main" Requires="p14">
+        <mc:AlternateContent xmlns:mc="http://schemas.openxmlformats.org/markup-compatibility/2006" xmlns:p14="http://schemas.microsoft.com/office/powerpoint/2010/main">
+          <mc:Choice Requires="p14">
             <p:contentPart p14:bwMode="auto" r:id="rId30">
               <p14:nvContentPartPr>
                 <p14:cNvPr id="86" name="Freihand 85">
@@ -18300,7 +18588,7 @@
               </p14:xfrm>
             </p:contentPart>
           </mc:Choice>
-          <mc:Fallback>
+          <mc:Fallback xmlns="">
             <p:pic>
               <p:nvPicPr>
                 <p:cNvPr id="86" name="Freihand 85">
@@ -18332,8 +18620,8 @@
           </mc:Fallback>
         </mc:AlternateContent>
       </p:grpSp>
-      <mc:AlternateContent xmlns:mc="http://schemas.openxmlformats.org/markup-compatibility/2006">
-        <mc:Choice xmlns:p14="http://schemas.microsoft.com/office/powerpoint/2010/main" Requires="p14">
+      <mc:AlternateContent xmlns:mc="http://schemas.openxmlformats.org/markup-compatibility/2006" xmlns:p14="http://schemas.microsoft.com/office/powerpoint/2010/main">
+        <mc:Choice Requires="p14">
           <p:contentPart p14:bwMode="auto" r:id="rId32">
             <p14:nvContentPartPr>
               <p14:cNvPr id="89" name="Freihand 88">
@@ -18352,7 +18640,7 @@
             </p14:xfrm>
           </p:contentPart>
         </mc:Choice>
-        <mc:Fallback>
+        <mc:Fallback xmlns="">
           <p:pic>
             <p:nvPicPr>
               <p:cNvPr id="89" name="Freihand 88">
@@ -18403,8 +18691,8 @@
             <a:chExt cx="50040" cy="93960"/>
           </a:xfrm>
         </p:grpSpPr>
-        <mc:AlternateContent xmlns:mc="http://schemas.openxmlformats.org/markup-compatibility/2006">
-          <mc:Choice xmlns:p14="http://schemas.microsoft.com/office/powerpoint/2010/main" Requires="p14">
+        <mc:AlternateContent xmlns:mc="http://schemas.openxmlformats.org/markup-compatibility/2006" xmlns:p14="http://schemas.microsoft.com/office/powerpoint/2010/main">
+          <mc:Choice Requires="p14">
             <p:contentPart p14:bwMode="auto" r:id="rId34">
               <p14:nvContentPartPr>
                 <p14:cNvPr id="90" name="Freihand 89">
@@ -18423,7 +18711,7 @@
               </p14:xfrm>
             </p:contentPart>
           </mc:Choice>
-          <mc:Fallback>
+          <mc:Fallback xmlns="">
             <p:pic>
               <p:nvPicPr>
                 <p:cNvPr id="90" name="Freihand 89">
@@ -18454,8 +18742,8 @@
             </p:pic>
           </mc:Fallback>
         </mc:AlternateContent>
-        <mc:AlternateContent xmlns:mc="http://schemas.openxmlformats.org/markup-compatibility/2006">
-          <mc:Choice xmlns:p14="http://schemas.microsoft.com/office/powerpoint/2010/main" Requires="p14">
+        <mc:AlternateContent xmlns:mc="http://schemas.openxmlformats.org/markup-compatibility/2006" xmlns:p14="http://schemas.microsoft.com/office/powerpoint/2010/main">
+          <mc:Choice Requires="p14">
             <p:contentPart p14:bwMode="auto" r:id="rId36">
               <p14:nvContentPartPr>
                 <p14:cNvPr id="91" name="Freihand 90">
@@ -18474,7 +18762,7 @@
               </p14:xfrm>
             </p:contentPart>
           </mc:Choice>
-          <mc:Fallback>
+          <mc:Fallback xmlns="">
             <p:pic>
               <p:nvPicPr>
                 <p:cNvPr id="91" name="Freihand 90">
@@ -18505,8 +18793,8 @@
             </p:pic>
           </mc:Fallback>
         </mc:AlternateContent>
-        <mc:AlternateContent xmlns:mc="http://schemas.openxmlformats.org/markup-compatibility/2006">
-          <mc:Choice xmlns:p14="http://schemas.microsoft.com/office/powerpoint/2010/main" Requires="p14">
+        <mc:AlternateContent xmlns:mc="http://schemas.openxmlformats.org/markup-compatibility/2006" xmlns:p14="http://schemas.microsoft.com/office/powerpoint/2010/main">
+          <mc:Choice Requires="p14">
             <p:contentPart p14:bwMode="auto" r:id="rId38">
               <p14:nvContentPartPr>
                 <p14:cNvPr id="92" name="Freihand 91">
@@ -18525,7 +18813,7 @@
               </p14:xfrm>
             </p:contentPart>
           </mc:Choice>
-          <mc:Fallback>
+          <mc:Fallback xmlns="">
             <p:pic>
               <p:nvPicPr>
                 <p:cNvPr id="92" name="Freihand 91">
@@ -18674,8 +18962,8 @@
           </a:prstGeom>
         </p:spPr>
       </p:pic>
-      <mc:AlternateContent xmlns:mc="http://schemas.openxmlformats.org/markup-compatibility/2006">
-        <mc:Choice xmlns:p14="http://schemas.microsoft.com/office/powerpoint/2010/main" Requires="p14">
+      <mc:AlternateContent xmlns:mc="http://schemas.openxmlformats.org/markup-compatibility/2006" xmlns:p14="http://schemas.microsoft.com/office/powerpoint/2010/main">
+        <mc:Choice Requires="p14">
           <p:contentPart p14:bwMode="auto" r:id="rId3">
             <p14:nvContentPartPr>
               <p14:cNvPr id="6" name="Freihand 5">
@@ -18694,7 +18982,7 @@
             </p14:xfrm>
           </p:contentPart>
         </mc:Choice>
-        <mc:Fallback>
+        <mc:Fallback xmlns="">
           <p:pic>
             <p:nvPicPr>
               <p:cNvPr id="6" name="Freihand 5">
@@ -18774,8 +19062,8 @@
             <a:chExt cx="54720" cy="96840"/>
           </a:xfrm>
         </p:grpSpPr>
-        <mc:AlternateContent xmlns:mc="http://schemas.openxmlformats.org/markup-compatibility/2006">
-          <mc:Choice xmlns:p14="http://schemas.microsoft.com/office/powerpoint/2010/main" Requires="p14">
+        <mc:AlternateContent xmlns:mc="http://schemas.openxmlformats.org/markup-compatibility/2006" xmlns:p14="http://schemas.microsoft.com/office/powerpoint/2010/main">
+          <mc:Choice Requires="p14">
             <p:contentPart p14:bwMode="auto" r:id="rId6">
               <p14:nvContentPartPr>
                 <p14:cNvPr id="10" name="Freihand 9">
@@ -18794,7 +19082,7 @@
               </p14:xfrm>
             </p:contentPart>
           </mc:Choice>
-          <mc:Fallback>
+          <mc:Fallback xmlns="">
             <p:pic>
               <p:nvPicPr>
                 <p:cNvPr id="10" name="Freihand 9">
@@ -18825,8 +19113,8 @@
             </p:pic>
           </mc:Fallback>
         </mc:AlternateContent>
-        <mc:AlternateContent xmlns:mc="http://schemas.openxmlformats.org/markup-compatibility/2006">
-          <mc:Choice xmlns:p14="http://schemas.microsoft.com/office/powerpoint/2010/main" Requires="p14">
+        <mc:AlternateContent xmlns:mc="http://schemas.openxmlformats.org/markup-compatibility/2006" xmlns:p14="http://schemas.microsoft.com/office/powerpoint/2010/main">
+          <mc:Choice Requires="p14">
             <p:contentPart p14:bwMode="auto" r:id="rId8">
               <p14:nvContentPartPr>
                 <p14:cNvPr id="12" name="Freihand 11">
@@ -18845,7 +19133,7 @@
               </p14:xfrm>
             </p:contentPart>
           </mc:Choice>
-          <mc:Fallback>
+          <mc:Fallback xmlns="">
             <p:pic>
               <p:nvPicPr>
                 <p:cNvPr id="12" name="Freihand 11">
@@ -18897,8 +19185,8 @@
             <a:chExt cx="77760" cy="106560"/>
           </a:xfrm>
         </p:grpSpPr>
-        <mc:AlternateContent xmlns:mc="http://schemas.openxmlformats.org/markup-compatibility/2006">
-          <mc:Choice xmlns:p14="http://schemas.microsoft.com/office/powerpoint/2010/main" Requires="p14">
+        <mc:AlternateContent xmlns:mc="http://schemas.openxmlformats.org/markup-compatibility/2006" xmlns:p14="http://schemas.microsoft.com/office/powerpoint/2010/main">
+          <mc:Choice Requires="p14">
             <p:contentPart p14:bwMode="auto" r:id="rId10">
               <p14:nvContentPartPr>
                 <p14:cNvPr id="14" name="Freihand 13">
@@ -18917,7 +19205,7 @@
               </p14:xfrm>
             </p:contentPart>
           </mc:Choice>
-          <mc:Fallback>
+          <mc:Fallback xmlns="">
             <p:pic>
               <p:nvPicPr>
                 <p:cNvPr id="14" name="Freihand 13">
@@ -18948,8 +19236,8 @@
             </p:pic>
           </mc:Fallback>
         </mc:AlternateContent>
-        <mc:AlternateContent xmlns:mc="http://schemas.openxmlformats.org/markup-compatibility/2006">
-          <mc:Choice xmlns:p14="http://schemas.microsoft.com/office/powerpoint/2010/main" Requires="p14">
+        <mc:AlternateContent xmlns:mc="http://schemas.openxmlformats.org/markup-compatibility/2006" xmlns:p14="http://schemas.microsoft.com/office/powerpoint/2010/main">
+          <mc:Choice Requires="p14">
             <p:contentPart p14:bwMode="auto" r:id="rId12">
               <p14:nvContentPartPr>
                 <p14:cNvPr id="15" name="Freihand 14">
@@ -18968,7 +19256,7 @@
               </p14:xfrm>
             </p:contentPart>
           </mc:Choice>
-          <mc:Fallback>
+          <mc:Fallback xmlns="">
             <p:pic>
               <p:nvPicPr>
                 <p:cNvPr id="15" name="Freihand 14">
@@ -19020,8 +19308,8 @@
             <a:chExt cx="97200" cy="122040"/>
           </a:xfrm>
         </p:grpSpPr>
-        <mc:AlternateContent xmlns:mc="http://schemas.openxmlformats.org/markup-compatibility/2006">
-          <mc:Choice xmlns:p14="http://schemas.microsoft.com/office/powerpoint/2010/main" Requires="p14">
+        <mc:AlternateContent xmlns:mc="http://schemas.openxmlformats.org/markup-compatibility/2006" xmlns:p14="http://schemas.microsoft.com/office/powerpoint/2010/main">
+          <mc:Choice Requires="p14">
             <p:contentPart p14:bwMode="auto" r:id="rId14">
               <p14:nvContentPartPr>
                 <p14:cNvPr id="17" name="Freihand 16">
@@ -19040,7 +19328,7 @@
               </p14:xfrm>
             </p:contentPart>
           </mc:Choice>
-          <mc:Fallback>
+          <mc:Fallback xmlns="">
             <p:pic>
               <p:nvPicPr>
                 <p:cNvPr id="17" name="Freihand 16">
@@ -19071,8 +19359,8 @@
             </p:pic>
           </mc:Fallback>
         </mc:AlternateContent>
-        <mc:AlternateContent xmlns:mc="http://schemas.openxmlformats.org/markup-compatibility/2006">
-          <mc:Choice xmlns:p14="http://schemas.microsoft.com/office/powerpoint/2010/main" Requires="p14">
+        <mc:AlternateContent xmlns:mc="http://schemas.openxmlformats.org/markup-compatibility/2006" xmlns:p14="http://schemas.microsoft.com/office/powerpoint/2010/main">
+          <mc:Choice Requires="p14">
             <p:contentPart p14:bwMode="auto" r:id="rId16">
               <p14:nvContentPartPr>
                 <p14:cNvPr id="18" name="Freihand 17">
@@ -19091,7 +19379,7 @@
               </p14:xfrm>
             </p:contentPart>
           </mc:Choice>
-          <mc:Fallback>
+          <mc:Fallback xmlns="">
             <p:pic>
               <p:nvPicPr>
                 <p:cNvPr id="18" name="Freihand 17">
@@ -19123,8 +19411,8 @@
           </mc:Fallback>
         </mc:AlternateContent>
       </p:grpSp>
-      <mc:AlternateContent xmlns:mc="http://schemas.openxmlformats.org/markup-compatibility/2006">
-        <mc:Choice xmlns:p14="http://schemas.microsoft.com/office/powerpoint/2010/main" Requires="p14">
+      <mc:AlternateContent xmlns:mc="http://schemas.openxmlformats.org/markup-compatibility/2006" xmlns:p14="http://schemas.microsoft.com/office/powerpoint/2010/main">
+        <mc:Choice Requires="p14">
           <p:contentPart p14:bwMode="auto" r:id="rId18">
             <p14:nvContentPartPr>
               <p14:cNvPr id="19" name="Freihand 18">
@@ -19143,7 +19431,7 @@
             </p14:xfrm>
           </p:contentPart>
         </mc:Choice>
-        <mc:Fallback>
+        <mc:Fallback xmlns="">
           <p:pic>
             <p:nvPicPr>
               <p:cNvPr id="19" name="Freihand 18">
@@ -19194,8 +19482,8 @@
             <a:chExt cx="74880" cy="72000"/>
           </a:xfrm>
         </p:grpSpPr>
-        <mc:AlternateContent xmlns:mc="http://schemas.openxmlformats.org/markup-compatibility/2006">
-          <mc:Choice xmlns:p14="http://schemas.microsoft.com/office/powerpoint/2010/main" Requires="p14">
+        <mc:AlternateContent xmlns:mc="http://schemas.openxmlformats.org/markup-compatibility/2006" xmlns:p14="http://schemas.microsoft.com/office/powerpoint/2010/main">
+          <mc:Choice Requires="p14">
             <p:contentPart p14:bwMode="auto" r:id="rId20">
               <p14:nvContentPartPr>
                 <p14:cNvPr id="21" name="Freihand 20">
@@ -19214,7 +19502,7 @@
               </p14:xfrm>
             </p:contentPart>
           </mc:Choice>
-          <mc:Fallback>
+          <mc:Fallback xmlns="">
             <p:pic>
               <p:nvPicPr>
                 <p:cNvPr id="21" name="Freihand 20">
@@ -19245,8 +19533,8 @@
             </p:pic>
           </mc:Fallback>
         </mc:AlternateContent>
-        <mc:AlternateContent xmlns:mc="http://schemas.openxmlformats.org/markup-compatibility/2006">
-          <mc:Choice xmlns:p14="http://schemas.microsoft.com/office/powerpoint/2010/main" Requires="p14">
+        <mc:AlternateContent xmlns:mc="http://schemas.openxmlformats.org/markup-compatibility/2006" xmlns:p14="http://schemas.microsoft.com/office/powerpoint/2010/main">
+          <mc:Choice Requires="p14">
             <p:contentPart p14:bwMode="auto" r:id="rId22">
               <p14:nvContentPartPr>
                 <p14:cNvPr id="22" name="Freihand 21">
@@ -19265,7 +19553,7 @@
               </p14:xfrm>
             </p:contentPart>
           </mc:Choice>
-          <mc:Fallback>
+          <mc:Fallback xmlns="">
             <p:pic>
               <p:nvPicPr>
                 <p:cNvPr id="22" name="Freihand 21">
@@ -19297,8 +19585,8 @@
           </mc:Fallback>
         </mc:AlternateContent>
       </p:grpSp>
-      <mc:AlternateContent xmlns:mc="http://schemas.openxmlformats.org/markup-compatibility/2006">
-        <mc:Choice xmlns:p14="http://schemas.microsoft.com/office/powerpoint/2010/main" Requires="p14">
+      <mc:AlternateContent xmlns:mc="http://schemas.openxmlformats.org/markup-compatibility/2006" xmlns:p14="http://schemas.microsoft.com/office/powerpoint/2010/main">
+        <mc:Choice Requires="p14">
           <p:contentPart p14:bwMode="auto" r:id="rId24">
             <p14:nvContentPartPr>
               <p14:cNvPr id="23" name="Freihand 22">
@@ -19317,7 +19605,7 @@
             </p14:xfrm>
           </p:contentPart>
         </mc:Choice>
-        <mc:Fallback>
+        <mc:Fallback xmlns="">
           <p:pic>
             <p:nvPicPr>
               <p:cNvPr id="23" name="Freihand 22">
@@ -19348,8 +19636,8 @@
           </p:pic>
         </mc:Fallback>
       </mc:AlternateContent>
-      <mc:AlternateContent xmlns:mc="http://schemas.openxmlformats.org/markup-compatibility/2006">
-        <mc:Choice xmlns:p14="http://schemas.microsoft.com/office/powerpoint/2010/main" Requires="p14">
+      <mc:AlternateContent xmlns:mc="http://schemas.openxmlformats.org/markup-compatibility/2006" xmlns:p14="http://schemas.microsoft.com/office/powerpoint/2010/main">
+        <mc:Choice Requires="p14">
           <p:contentPart p14:bwMode="auto" r:id="rId26">
             <p14:nvContentPartPr>
               <p14:cNvPr id="24" name="Freihand 23">
@@ -19368,7 +19656,7 @@
             </p14:xfrm>
           </p:contentPart>
         </mc:Choice>
-        <mc:Fallback>
+        <mc:Fallback xmlns="">
           <p:pic>
             <p:nvPicPr>
               <p:cNvPr id="24" name="Freihand 23">
@@ -19419,8 +19707,8 @@
             <a:chExt cx="100080" cy="113040"/>
           </a:xfrm>
         </p:grpSpPr>
-        <mc:AlternateContent xmlns:mc="http://schemas.openxmlformats.org/markup-compatibility/2006">
-          <mc:Choice xmlns:p14="http://schemas.microsoft.com/office/powerpoint/2010/main" Requires="p14">
+        <mc:AlternateContent xmlns:mc="http://schemas.openxmlformats.org/markup-compatibility/2006" xmlns:p14="http://schemas.microsoft.com/office/powerpoint/2010/main">
+          <mc:Choice Requires="p14">
             <p:contentPart p14:bwMode="auto" r:id="rId28">
               <p14:nvContentPartPr>
                 <p14:cNvPr id="26" name="Freihand 25">
@@ -19439,7 +19727,7 @@
               </p14:xfrm>
             </p:contentPart>
           </mc:Choice>
-          <mc:Fallback>
+          <mc:Fallback xmlns="">
             <p:pic>
               <p:nvPicPr>
                 <p:cNvPr id="26" name="Freihand 25">
@@ -19470,8 +19758,8 @@
             </p:pic>
           </mc:Fallback>
         </mc:AlternateContent>
-        <mc:AlternateContent xmlns:mc="http://schemas.openxmlformats.org/markup-compatibility/2006">
-          <mc:Choice xmlns:p14="http://schemas.microsoft.com/office/powerpoint/2010/main" Requires="p14">
+        <mc:AlternateContent xmlns:mc="http://schemas.openxmlformats.org/markup-compatibility/2006" xmlns:p14="http://schemas.microsoft.com/office/powerpoint/2010/main">
+          <mc:Choice Requires="p14">
             <p:contentPart p14:bwMode="auto" r:id="rId30">
               <p14:nvContentPartPr>
                 <p14:cNvPr id="27" name="Freihand 26">
@@ -19490,7 +19778,7 @@
               </p14:xfrm>
             </p:contentPart>
           </mc:Choice>
-          <mc:Fallback>
+          <mc:Fallback xmlns="">
             <p:pic>
               <p:nvPicPr>
                 <p:cNvPr id="27" name="Freihand 26">
@@ -19521,8 +19809,8 @@
             </p:pic>
           </mc:Fallback>
         </mc:AlternateContent>
-        <mc:AlternateContent xmlns:mc="http://schemas.openxmlformats.org/markup-compatibility/2006">
-          <mc:Choice xmlns:p14="http://schemas.microsoft.com/office/powerpoint/2010/main" Requires="p14">
+        <mc:AlternateContent xmlns:mc="http://schemas.openxmlformats.org/markup-compatibility/2006" xmlns:p14="http://schemas.microsoft.com/office/powerpoint/2010/main">
+          <mc:Choice Requires="p14">
             <p:contentPart p14:bwMode="auto" r:id="rId32">
               <p14:nvContentPartPr>
                 <p14:cNvPr id="28" name="Freihand 27">
@@ -19541,7 +19829,7 @@
               </p14:xfrm>
             </p:contentPart>
           </mc:Choice>
-          <mc:Fallback>
+          <mc:Fallback xmlns="">
             <p:pic>
               <p:nvPicPr>
                 <p:cNvPr id="28" name="Freihand 27">
@@ -19573,8 +19861,8 @@
           </mc:Fallback>
         </mc:AlternateContent>
       </p:grpSp>
-      <mc:AlternateContent xmlns:mc="http://schemas.openxmlformats.org/markup-compatibility/2006">
-        <mc:Choice xmlns:p14="http://schemas.microsoft.com/office/powerpoint/2010/main" Requires="p14">
+      <mc:AlternateContent xmlns:mc="http://schemas.openxmlformats.org/markup-compatibility/2006" xmlns:p14="http://schemas.microsoft.com/office/powerpoint/2010/main">
+        <mc:Choice Requires="p14">
           <p:contentPart p14:bwMode="auto" r:id="rId34">
             <p14:nvContentPartPr>
               <p14:cNvPr id="29" name="Freihand 28">
@@ -19593,7 +19881,7 @@
             </p14:xfrm>
           </p:contentPart>
         </mc:Choice>
-        <mc:Fallback>
+        <mc:Fallback xmlns="">
           <p:pic>
             <p:nvPicPr>
               <p:cNvPr id="29" name="Freihand 28">
@@ -19644,8 +19932,8 @@
             <a:chExt cx="50040" cy="93960"/>
           </a:xfrm>
         </p:grpSpPr>
-        <mc:AlternateContent xmlns:mc="http://schemas.openxmlformats.org/markup-compatibility/2006">
-          <mc:Choice xmlns:p14="http://schemas.microsoft.com/office/powerpoint/2010/main" Requires="p14">
+        <mc:AlternateContent xmlns:mc="http://schemas.openxmlformats.org/markup-compatibility/2006" xmlns:p14="http://schemas.microsoft.com/office/powerpoint/2010/main">
+          <mc:Choice Requires="p14">
             <p:contentPart p14:bwMode="auto" r:id="rId36">
               <p14:nvContentPartPr>
                 <p14:cNvPr id="31" name="Freihand 30">
@@ -19664,7 +19952,7 @@
               </p14:xfrm>
             </p:contentPart>
           </mc:Choice>
-          <mc:Fallback>
+          <mc:Fallback xmlns="">
             <p:pic>
               <p:nvPicPr>
                 <p:cNvPr id="31" name="Freihand 30">
@@ -19695,8 +19983,8 @@
             </p:pic>
           </mc:Fallback>
         </mc:AlternateContent>
-        <mc:AlternateContent xmlns:mc="http://schemas.openxmlformats.org/markup-compatibility/2006">
-          <mc:Choice xmlns:p14="http://schemas.microsoft.com/office/powerpoint/2010/main" Requires="p14">
+        <mc:AlternateContent xmlns:mc="http://schemas.openxmlformats.org/markup-compatibility/2006" xmlns:p14="http://schemas.microsoft.com/office/powerpoint/2010/main">
+          <mc:Choice Requires="p14">
             <p:contentPart p14:bwMode="auto" r:id="rId38">
               <p14:nvContentPartPr>
                 <p14:cNvPr id="32" name="Freihand 31">
@@ -19715,7 +20003,7 @@
               </p14:xfrm>
             </p:contentPart>
           </mc:Choice>
-          <mc:Fallback>
+          <mc:Fallback xmlns="">
             <p:pic>
               <p:nvPicPr>
                 <p:cNvPr id="32" name="Freihand 31">
@@ -19746,8 +20034,8 @@
             </p:pic>
           </mc:Fallback>
         </mc:AlternateContent>
-        <mc:AlternateContent xmlns:mc="http://schemas.openxmlformats.org/markup-compatibility/2006">
-          <mc:Choice xmlns:p14="http://schemas.microsoft.com/office/powerpoint/2010/main" Requires="p14">
+        <mc:AlternateContent xmlns:mc="http://schemas.openxmlformats.org/markup-compatibility/2006" xmlns:p14="http://schemas.microsoft.com/office/powerpoint/2010/main">
+          <mc:Choice Requires="p14">
             <p:contentPart p14:bwMode="auto" r:id="rId40">
               <p14:nvContentPartPr>
                 <p14:cNvPr id="33" name="Freihand 32">
@@ -19766,7 +20054,7 @@
               </p14:xfrm>
             </p:contentPart>
           </mc:Choice>
-          <mc:Fallback>
+          <mc:Fallback xmlns="">
             <p:pic>
               <p:nvPicPr>
                 <p:cNvPr id="33" name="Freihand 32">

</xml_diff>